<commit_message>
updating week 10 day 1
</commit_message>
<xml_diff>
--- a/Week10/Day1/1 - Intro to Deep Learning.pptx
+++ b/Week10/Day1/1 - Intro to Deep Learning.pptx
@@ -453,7 +453,7 @@
           <a:p>
             <a:fld id="{846CE7D5-CF57-46EF-B807-FDD0502418D4}" type="datetimeFigureOut">
               <a:rPr lang="en-US" smtClean="0"/>
-              <a:t>10/12/21</a:t>
+              <a:t>10/19/21</a:t>
             </a:fld>
             <a:endParaRPr lang="en-US"/>
           </a:p>
@@ -623,7 +623,7 @@
           <a:p>
             <a:fld id="{846CE7D5-CF57-46EF-B807-FDD0502418D4}" type="datetimeFigureOut">
               <a:rPr lang="en-US" smtClean="0"/>
-              <a:t>10/12/21</a:t>
+              <a:t>10/19/21</a:t>
             </a:fld>
             <a:endParaRPr lang="en-US"/>
           </a:p>
@@ -803,7 +803,7 @@
           <a:p>
             <a:fld id="{846CE7D5-CF57-46EF-B807-FDD0502418D4}" type="datetimeFigureOut">
               <a:rPr lang="en-US" smtClean="0"/>
-              <a:t>10/12/21</a:t>
+              <a:t>10/19/21</a:t>
             </a:fld>
             <a:endParaRPr lang="en-US"/>
           </a:p>
@@ -973,7 +973,7 @@
           <a:p>
             <a:fld id="{846CE7D5-CF57-46EF-B807-FDD0502418D4}" type="datetimeFigureOut">
               <a:rPr lang="en-US" smtClean="0"/>
-              <a:t>10/12/21</a:t>
+              <a:t>10/19/21</a:t>
             </a:fld>
             <a:endParaRPr lang="en-US"/>
           </a:p>
@@ -1219,7 +1219,7 @@
           <a:p>
             <a:fld id="{846CE7D5-CF57-46EF-B807-FDD0502418D4}" type="datetimeFigureOut">
               <a:rPr lang="en-US" smtClean="0"/>
-              <a:t>10/12/21</a:t>
+              <a:t>10/19/21</a:t>
             </a:fld>
             <a:endParaRPr lang="en-US"/>
           </a:p>
@@ -1451,7 +1451,7 @@
           <a:p>
             <a:fld id="{846CE7D5-CF57-46EF-B807-FDD0502418D4}" type="datetimeFigureOut">
               <a:rPr lang="en-US" smtClean="0"/>
-              <a:t>10/12/21</a:t>
+              <a:t>10/19/21</a:t>
             </a:fld>
             <a:endParaRPr lang="en-US"/>
           </a:p>
@@ -1818,7 +1818,7 @@
           <a:p>
             <a:fld id="{846CE7D5-CF57-46EF-B807-FDD0502418D4}" type="datetimeFigureOut">
               <a:rPr lang="en-US" smtClean="0"/>
-              <a:t>10/12/21</a:t>
+              <a:t>10/19/21</a:t>
             </a:fld>
             <a:endParaRPr lang="en-US"/>
           </a:p>
@@ -1936,7 +1936,7 @@
           <a:p>
             <a:fld id="{846CE7D5-CF57-46EF-B807-FDD0502418D4}" type="datetimeFigureOut">
               <a:rPr lang="en-US" smtClean="0"/>
-              <a:t>10/12/21</a:t>
+              <a:t>10/19/21</a:t>
             </a:fld>
             <a:endParaRPr lang="en-US"/>
           </a:p>
@@ -2031,7 +2031,7 @@
           <a:p>
             <a:fld id="{846CE7D5-CF57-46EF-B807-FDD0502418D4}" type="datetimeFigureOut">
               <a:rPr lang="en-US" smtClean="0"/>
-              <a:t>10/12/21</a:t>
+              <a:t>10/19/21</a:t>
             </a:fld>
             <a:endParaRPr lang="en-US"/>
           </a:p>
@@ -2308,7 +2308,7 @@
           <a:p>
             <a:fld id="{846CE7D5-CF57-46EF-B807-FDD0502418D4}" type="datetimeFigureOut">
               <a:rPr lang="en-US" smtClean="0"/>
-              <a:t>10/12/21</a:t>
+              <a:t>10/19/21</a:t>
             </a:fld>
             <a:endParaRPr lang="en-US"/>
           </a:p>
@@ -2565,7 +2565,7 @@
           <a:p>
             <a:fld id="{846CE7D5-CF57-46EF-B807-FDD0502418D4}" type="datetimeFigureOut">
               <a:rPr lang="en-US" smtClean="0"/>
-              <a:t>10/12/21</a:t>
+              <a:t>10/19/21</a:t>
             </a:fld>
             <a:endParaRPr lang="en-US"/>
           </a:p>
@@ -2778,7 +2778,7 @@
           <a:p>
             <a:fld id="{846CE7D5-CF57-46EF-B807-FDD0502418D4}" type="datetimeFigureOut">
               <a:rPr lang="en-US" smtClean="0"/>
-              <a:t>10/12/21</a:t>
+              <a:t>10/19/21</a:t>
             </a:fld>
             <a:endParaRPr lang="en-US"/>
           </a:p>
@@ -10726,9 +10726,9 @@
                 <a:latin typeface="Arial"/>
                 <a:cs typeface="Calibri Light"/>
               </a:rPr>
-              <a:t>The problem : How Machine Learning Solves</a:t>
-            </a:r>
-            <a:endParaRPr lang="en-US" sz="3200" dirty="0" err="1">
+              <a:t>The problem : How Deep Learning Solves</a:t>
+            </a:r>
+            <a:endParaRPr lang="en-US" sz="3200" dirty="0">
               <a:latin typeface="Arial"/>
               <a:cs typeface="Arial"/>
             </a:endParaRPr>
@@ -10773,7 +10773,7 @@
                 <a:latin typeface="Arial"/>
                 <a:cs typeface="Arial"/>
               </a:rPr>
-              <a:t>Here, ML approach consists of using a neural network to learn the relation between input and output. We can think of neural network as a stack of neural network </a:t>
+              <a:t>Here, DL approach consists of using a neural network to learn the relation between input and output. We can think of neural network as a stack of neural network </a:t>
             </a:r>
             <a:r>
               <a:rPr lang="en-US" sz="1600" b="1" dirty="0">
@@ -13599,6 +13599,130 @@
               <a:latin typeface="Arial"/>
               <a:cs typeface="Arial"/>
             </a:endParaRPr>
+          </a:p>
+        </p:txBody>
+      </p:sp>
+      <p:pic>
+        <p:nvPicPr>
+          <p:cNvPr id="1026" name="Picture 2" descr="Softmax Activation Function Explained | by Dario Radečić | Towards Data  Science">
+            <a:extLst>
+              <a:ext uri="{FF2B5EF4-FFF2-40B4-BE49-F238E27FC236}">
+                <a16:creationId xmlns:a16="http://schemas.microsoft.com/office/drawing/2014/main" id="{20F5168B-6383-9349-A650-D2D9413AB004}"/>
+              </a:ext>
+            </a:extLst>
+          </p:cNvPr>
+          <p:cNvPicPr>
+            <a:picLocks noChangeAspect="1" noChangeArrowheads="1"/>
+          </p:cNvPicPr>
+          <p:nvPr/>
+        </p:nvPicPr>
+        <p:blipFill>
+          <a:blip r:embed="rId4">
+            <a:extLst>
+              <a:ext uri="{28A0092B-C50C-407E-A947-70E740481C1C}">
+                <a14:useLocalDpi xmlns:a14="http://schemas.microsoft.com/office/drawing/2010/main" val="0"/>
+              </a:ext>
+            </a:extLst>
+          </a:blip>
+          <a:srcRect/>
+          <a:stretch>
+            <a:fillRect/>
+          </a:stretch>
+        </p:blipFill>
+        <p:spPr bwMode="auto">
+          <a:xfrm>
+            <a:off x="5315248" y="5008979"/>
+            <a:ext cx="3155950" cy="1622682"/>
+          </a:xfrm>
+          <a:prstGeom prst="rect">
+            <a:avLst/>
+          </a:prstGeom>
+          <a:noFill/>
+          <a:extLst>
+            <a:ext uri="{909E8E84-426E-40DD-AFC4-6F175D3DCCD1}">
+              <a14:hiddenFill xmlns:a14="http://schemas.microsoft.com/office/drawing/2010/main">
+                <a:solidFill>
+                  <a:srgbClr val="FFFFFF"/>
+                </a:solidFill>
+              </a14:hiddenFill>
+            </a:ext>
+          </a:extLst>
+        </p:spPr>
+      </p:pic>
+      <p:sp>
+        <p:nvSpPr>
+          <p:cNvPr id="2" name="TextBox 1">
+            <a:extLst>
+              <a:ext uri="{FF2B5EF4-FFF2-40B4-BE49-F238E27FC236}">
+                <a16:creationId xmlns:a16="http://schemas.microsoft.com/office/drawing/2014/main" id="{B7F8922C-C41C-1540-AD47-55FF7CB3D117}"/>
+              </a:ext>
+            </a:extLst>
+          </p:cNvPr>
+          <p:cNvSpPr txBox="1"/>
+          <p:nvPr/>
+        </p:nvSpPr>
+        <p:spPr>
+          <a:xfrm>
+            <a:off x="5371731" y="331694"/>
+            <a:ext cx="2786151" cy="369332"/>
+          </a:xfrm>
+          <a:prstGeom prst="rect">
+            <a:avLst/>
+          </a:prstGeom>
+          <a:solidFill>
+            <a:schemeClr val="bg1"/>
+          </a:solidFill>
+        </p:spPr>
+        <p:txBody>
+          <a:bodyPr wrap="square" rtlCol="0">
+            <a:spAutoFit/>
+          </a:bodyPr>
+          <a:lstStyle/>
+          <a:p>
+            <a:r>
+              <a:rPr lang="en-US" dirty="0"/>
+              <a:t>Activation Functions</a:t>
+            </a:r>
+          </a:p>
+        </p:txBody>
+      </p:sp>
+      <p:sp>
+        <p:nvSpPr>
+          <p:cNvPr id="3" name="TextBox 2">
+            <a:extLst>
+              <a:ext uri="{FF2B5EF4-FFF2-40B4-BE49-F238E27FC236}">
+                <a16:creationId xmlns:a16="http://schemas.microsoft.com/office/drawing/2014/main" id="{C4437215-5CB2-2D40-8D75-E620753BFDCB}"/>
+              </a:ext>
+            </a:extLst>
+          </p:cNvPr>
+          <p:cNvSpPr txBox="1"/>
+          <p:nvPr/>
+        </p:nvSpPr>
+        <p:spPr>
+          <a:xfrm>
+            <a:off x="8635313" y="5325977"/>
+            <a:ext cx="3155950" cy="1200329"/>
+          </a:xfrm>
+          <a:prstGeom prst="rect">
+            <a:avLst/>
+          </a:prstGeom>
+          <a:noFill/>
+          <a:ln>
+            <a:solidFill>
+              <a:schemeClr val="accent2"/>
+            </a:solidFill>
+          </a:ln>
+        </p:spPr>
+        <p:txBody>
+          <a:bodyPr wrap="square" rtlCol="0">
+            <a:spAutoFit/>
+          </a:bodyPr>
+          <a:lstStyle/>
+          <a:p>
+            <a:r>
+              <a:rPr lang="en-US" dirty="0"/>
+              <a:t>Softmax converts the input vector to a probabilistic domain. This is very important for us for the final output layer.</a:t>
+            </a:r>
           </a:p>
         </p:txBody>
       </p:sp>

</xml_diff>

<commit_message>
Week10: adding new day2 files and moving day2 to day3
</commit_message>
<xml_diff>
--- a/Week10/Day1/1 - Intro to Deep Learning.pptx
+++ b/Week10/Day1/1 - Intro to Deep Learning.pptx
@@ -4,6 +4,9 @@
   <p:sldMasterIdLst>
     <p:sldMasterId id="2147483660" r:id="rId1"/>
   </p:sldMasterIdLst>
+  <p:notesMasterIdLst>
+    <p:notesMasterId r:id="rId20"/>
+  </p:notesMasterIdLst>
   <p:sldIdLst>
     <p:sldId id="257" r:id="rId2"/>
     <p:sldId id="259" r:id="rId3"/>
@@ -22,6 +25,7 @@
     <p:sldId id="266" r:id="rId16"/>
     <p:sldId id="274" r:id="rId17"/>
     <p:sldId id="258" r:id="rId18"/>
+    <p:sldId id="276" r:id="rId19"/>
   </p:sldIdLst>
   <p:sldSz cx="12192000" cy="6858000"/>
   <p:notesSz cx="6858000" cy="9144000"/>
@@ -320,6 +324,699 @@
     </pc:docChg>
   </pc:docChgLst>
 </pc:chgInfo>
+</file>
+
+<file path=ppt/notesMasters/notesMaster1.xml><?xml version="1.0" encoding="utf-8"?>
+<p:notesMaster xmlns:a="http://schemas.openxmlformats.org/drawingml/2006/main" xmlns:r="http://schemas.openxmlformats.org/officeDocument/2006/relationships" xmlns:p="http://schemas.openxmlformats.org/presentationml/2006/main">
+  <p:cSld>
+    <p:bg>
+      <p:bgRef idx="1001">
+        <a:schemeClr val="bg1"/>
+      </p:bgRef>
+    </p:bg>
+    <p:spTree>
+      <p:nvGrpSpPr>
+        <p:cNvPr id="1" name=""/>
+        <p:cNvGrpSpPr/>
+        <p:nvPr/>
+      </p:nvGrpSpPr>
+      <p:grpSpPr>
+        <a:xfrm>
+          <a:off x="0" y="0"/>
+          <a:ext cx="0" cy="0"/>
+          <a:chOff x="0" y="0"/>
+          <a:chExt cx="0" cy="0"/>
+        </a:xfrm>
+      </p:grpSpPr>
+      <p:sp>
+        <p:nvSpPr>
+          <p:cNvPr id="2" name="Header Placeholder 1"/>
+          <p:cNvSpPr>
+            <a:spLocks noGrp="1"/>
+          </p:cNvSpPr>
+          <p:nvPr>
+            <p:ph type="hdr" sz="quarter"/>
+          </p:nvPr>
+        </p:nvSpPr>
+        <p:spPr>
+          <a:xfrm>
+            <a:off x="0" y="0"/>
+            <a:ext cx="2971800" cy="458788"/>
+          </a:xfrm>
+          <a:prstGeom prst="rect">
+            <a:avLst/>
+          </a:prstGeom>
+        </p:spPr>
+        <p:txBody>
+          <a:bodyPr vert="horz" lIns="91440" tIns="45720" rIns="91440" bIns="45720" rtlCol="0"/>
+          <a:lstStyle>
+            <a:lvl1pPr algn="l">
+              <a:defRPr sz="1200"/>
+            </a:lvl1pPr>
+          </a:lstStyle>
+          <a:p>
+            <a:endParaRPr lang="en-US"/>
+          </a:p>
+        </p:txBody>
+      </p:sp>
+      <p:sp>
+        <p:nvSpPr>
+          <p:cNvPr id="3" name="Date Placeholder 2"/>
+          <p:cNvSpPr>
+            <a:spLocks noGrp="1"/>
+          </p:cNvSpPr>
+          <p:nvPr>
+            <p:ph type="dt" idx="1"/>
+          </p:nvPr>
+        </p:nvSpPr>
+        <p:spPr>
+          <a:xfrm>
+            <a:off x="3884613" y="0"/>
+            <a:ext cx="2971800" cy="458788"/>
+          </a:xfrm>
+          <a:prstGeom prst="rect">
+            <a:avLst/>
+          </a:prstGeom>
+        </p:spPr>
+        <p:txBody>
+          <a:bodyPr vert="horz" lIns="91440" tIns="45720" rIns="91440" bIns="45720" rtlCol="0"/>
+          <a:lstStyle>
+            <a:lvl1pPr algn="r">
+              <a:defRPr sz="1200"/>
+            </a:lvl1pPr>
+          </a:lstStyle>
+          <a:p>
+            <a:fld id="{791A40F8-5CC8-1843-AF73-E426698572B8}" type="datetimeFigureOut">
+              <a:rPr lang="en-US" smtClean="0"/>
+              <a:t>10/19/21</a:t>
+            </a:fld>
+            <a:endParaRPr lang="en-US"/>
+          </a:p>
+        </p:txBody>
+      </p:sp>
+      <p:sp>
+        <p:nvSpPr>
+          <p:cNvPr id="4" name="Slide Image Placeholder 3"/>
+          <p:cNvSpPr>
+            <a:spLocks noGrp="1" noRot="1" noChangeAspect="1"/>
+          </p:cNvSpPr>
+          <p:nvPr>
+            <p:ph type="sldImg" idx="2"/>
+          </p:nvPr>
+        </p:nvSpPr>
+        <p:spPr>
+          <a:xfrm>
+            <a:off x="685800" y="1143000"/>
+            <a:ext cx="5486400" cy="3086100"/>
+          </a:xfrm>
+          <a:prstGeom prst="rect">
+            <a:avLst/>
+          </a:prstGeom>
+          <a:noFill/>
+          <a:ln w="12700">
+            <a:solidFill>
+              <a:prstClr val="black"/>
+            </a:solidFill>
+          </a:ln>
+        </p:spPr>
+        <p:txBody>
+          <a:bodyPr vert="horz" lIns="91440" tIns="45720" rIns="91440" bIns="45720" rtlCol="0" anchor="ctr"/>
+          <a:lstStyle/>
+          <a:p>
+            <a:endParaRPr lang="en-US"/>
+          </a:p>
+        </p:txBody>
+      </p:sp>
+      <p:sp>
+        <p:nvSpPr>
+          <p:cNvPr id="5" name="Notes Placeholder 4"/>
+          <p:cNvSpPr>
+            <a:spLocks noGrp="1"/>
+          </p:cNvSpPr>
+          <p:nvPr>
+            <p:ph type="body" sz="quarter" idx="3"/>
+          </p:nvPr>
+        </p:nvSpPr>
+        <p:spPr>
+          <a:xfrm>
+            <a:off x="685800" y="4400550"/>
+            <a:ext cx="5486400" cy="3600450"/>
+          </a:xfrm>
+          <a:prstGeom prst="rect">
+            <a:avLst/>
+          </a:prstGeom>
+        </p:spPr>
+        <p:txBody>
+          <a:bodyPr vert="horz" lIns="91440" tIns="45720" rIns="91440" bIns="45720" rtlCol="0"/>
+          <a:lstStyle/>
+          <a:p>
+            <a:pPr lvl="0"/>
+            <a:r>
+              <a:rPr lang="en-US"/>
+              <a:t>Click to edit Master text styles</a:t>
+            </a:r>
+          </a:p>
+          <a:p>
+            <a:pPr lvl="1"/>
+            <a:r>
+              <a:rPr lang="en-US"/>
+              <a:t>Second level</a:t>
+            </a:r>
+          </a:p>
+          <a:p>
+            <a:pPr lvl="2"/>
+            <a:r>
+              <a:rPr lang="en-US"/>
+              <a:t>Third level</a:t>
+            </a:r>
+          </a:p>
+          <a:p>
+            <a:pPr lvl="3"/>
+            <a:r>
+              <a:rPr lang="en-US"/>
+              <a:t>Fourth level</a:t>
+            </a:r>
+          </a:p>
+          <a:p>
+            <a:pPr lvl="4"/>
+            <a:r>
+              <a:rPr lang="en-US"/>
+              <a:t>Fifth level</a:t>
+            </a:r>
+          </a:p>
+        </p:txBody>
+      </p:sp>
+      <p:sp>
+        <p:nvSpPr>
+          <p:cNvPr id="6" name="Footer Placeholder 5"/>
+          <p:cNvSpPr>
+            <a:spLocks noGrp="1"/>
+          </p:cNvSpPr>
+          <p:nvPr>
+            <p:ph type="ftr" sz="quarter" idx="4"/>
+          </p:nvPr>
+        </p:nvSpPr>
+        <p:spPr>
+          <a:xfrm>
+            <a:off x="0" y="8685213"/>
+            <a:ext cx="2971800" cy="458787"/>
+          </a:xfrm>
+          <a:prstGeom prst="rect">
+            <a:avLst/>
+          </a:prstGeom>
+        </p:spPr>
+        <p:txBody>
+          <a:bodyPr vert="horz" lIns="91440" tIns="45720" rIns="91440" bIns="45720" rtlCol="0" anchor="b"/>
+          <a:lstStyle>
+            <a:lvl1pPr algn="l">
+              <a:defRPr sz="1200"/>
+            </a:lvl1pPr>
+          </a:lstStyle>
+          <a:p>
+            <a:endParaRPr lang="en-US"/>
+          </a:p>
+        </p:txBody>
+      </p:sp>
+      <p:sp>
+        <p:nvSpPr>
+          <p:cNvPr id="7" name="Slide Number Placeholder 6"/>
+          <p:cNvSpPr>
+            <a:spLocks noGrp="1"/>
+          </p:cNvSpPr>
+          <p:nvPr>
+            <p:ph type="sldNum" sz="quarter" idx="5"/>
+          </p:nvPr>
+        </p:nvSpPr>
+        <p:spPr>
+          <a:xfrm>
+            <a:off x="3884613" y="8685213"/>
+            <a:ext cx="2971800" cy="458787"/>
+          </a:xfrm>
+          <a:prstGeom prst="rect">
+            <a:avLst/>
+          </a:prstGeom>
+        </p:spPr>
+        <p:txBody>
+          <a:bodyPr vert="horz" lIns="91440" tIns="45720" rIns="91440" bIns="45720" rtlCol="0" anchor="b"/>
+          <a:lstStyle>
+            <a:lvl1pPr algn="r">
+              <a:defRPr sz="1200"/>
+            </a:lvl1pPr>
+          </a:lstStyle>
+          <a:p>
+            <a:fld id="{D1D7FD47-4321-7A46-9D4D-236AB1C0A7AE}" type="slidenum">
+              <a:rPr lang="en-US" smtClean="0"/>
+              <a:t>‹#›</a:t>
+            </a:fld>
+            <a:endParaRPr lang="en-US"/>
+          </a:p>
+        </p:txBody>
+      </p:sp>
+    </p:spTree>
+    <p:extLst>
+      <p:ext uri="{BB962C8B-B14F-4D97-AF65-F5344CB8AC3E}">
+        <p14:creationId xmlns:p14="http://schemas.microsoft.com/office/powerpoint/2010/main" val="1815362010"/>
+      </p:ext>
+    </p:extLst>
+  </p:cSld>
+  <p:clrMap bg1="lt1" tx1="dk1" bg2="lt2" tx2="dk2" accent1="accent1" accent2="accent2" accent3="accent3" accent4="accent4" accent5="accent5" accent6="accent6" hlink="hlink" folHlink="folHlink"/>
+  <p:notesStyle>
+    <a:lvl1pPr marL="0" algn="l" defTabSz="914400" rtl="0" eaLnBrk="1" latinLnBrk="0" hangingPunct="1">
+      <a:defRPr sz="1200" kern="1200">
+        <a:solidFill>
+          <a:schemeClr val="tx1"/>
+        </a:solidFill>
+        <a:latin typeface="+mn-lt"/>
+        <a:ea typeface="+mn-ea"/>
+        <a:cs typeface="+mn-cs"/>
+      </a:defRPr>
+    </a:lvl1pPr>
+    <a:lvl2pPr marL="457200" algn="l" defTabSz="914400" rtl="0" eaLnBrk="1" latinLnBrk="0" hangingPunct="1">
+      <a:defRPr sz="1200" kern="1200">
+        <a:solidFill>
+          <a:schemeClr val="tx1"/>
+        </a:solidFill>
+        <a:latin typeface="+mn-lt"/>
+        <a:ea typeface="+mn-ea"/>
+        <a:cs typeface="+mn-cs"/>
+      </a:defRPr>
+    </a:lvl2pPr>
+    <a:lvl3pPr marL="914400" algn="l" defTabSz="914400" rtl="0" eaLnBrk="1" latinLnBrk="0" hangingPunct="1">
+      <a:defRPr sz="1200" kern="1200">
+        <a:solidFill>
+          <a:schemeClr val="tx1"/>
+        </a:solidFill>
+        <a:latin typeface="+mn-lt"/>
+        <a:ea typeface="+mn-ea"/>
+        <a:cs typeface="+mn-cs"/>
+      </a:defRPr>
+    </a:lvl3pPr>
+    <a:lvl4pPr marL="1371600" algn="l" defTabSz="914400" rtl="0" eaLnBrk="1" latinLnBrk="0" hangingPunct="1">
+      <a:defRPr sz="1200" kern="1200">
+        <a:solidFill>
+          <a:schemeClr val="tx1"/>
+        </a:solidFill>
+        <a:latin typeface="+mn-lt"/>
+        <a:ea typeface="+mn-ea"/>
+        <a:cs typeface="+mn-cs"/>
+      </a:defRPr>
+    </a:lvl4pPr>
+    <a:lvl5pPr marL="1828800" algn="l" defTabSz="914400" rtl="0" eaLnBrk="1" latinLnBrk="0" hangingPunct="1">
+      <a:defRPr sz="1200" kern="1200">
+        <a:solidFill>
+          <a:schemeClr val="tx1"/>
+        </a:solidFill>
+        <a:latin typeface="+mn-lt"/>
+        <a:ea typeface="+mn-ea"/>
+        <a:cs typeface="+mn-cs"/>
+      </a:defRPr>
+    </a:lvl5pPr>
+    <a:lvl6pPr marL="2286000" algn="l" defTabSz="914400" rtl="0" eaLnBrk="1" latinLnBrk="0" hangingPunct="1">
+      <a:defRPr sz="1200" kern="1200">
+        <a:solidFill>
+          <a:schemeClr val="tx1"/>
+        </a:solidFill>
+        <a:latin typeface="+mn-lt"/>
+        <a:ea typeface="+mn-ea"/>
+        <a:cs typeface="+mn-cs"/>
+      </a:defRPr>
+    </a:lvl6pPr>
+    <a:lvl7pPr marL="2743200" algn="l" defTabSz="914400" rtl="0" eaLnBrk="1" latinLnBrk="0" hangingPunct="1">
+      <a:defRPr sz="1200" kern="1200">
+        <a:solidFill>
+          <a:schemeClr val="tx1"/>
+        </a:solidFill>
+        <a:latin typeface="+mn-lt"/>
+        <a:ea typeface="+mn-ea"/>
+        <a:cs typeface="+mn-cs"/>
+      </a:defRPr>
+    </a:lvl7pPr>
+    <a:lvl8pPr marL="3200400" algn="l" defTabSz="914400" rtl="0" eaLnBrk="1" latinLnBrk="0" hangingPunct="1">
+      <a:defRPr sz="1200" kern="1200">
+        <a:solidFill>
+          <a:schemeClr val="tx1"/>
+        </a:solidFill>
+        <a:latin typeface="+mn-lt"/>
+        <a:ea typeface="+mn-ea"/>
+        <a:cs typeface="+mn-cs"/>
+      </a:defRPr>
+    </a:lvl8pPr>
+    <a:lvl9pPr marL="3657600" algn="l" defTabSz="914400" rtl="0" eaLnBrk="1" latinLnBrk="0" hangingPunct="1">
+      <a:defRPr sz="1200" kern="1200">
+        <a:solidFill>
+          <a:schemeClr val="tx1"/>
+        </a:solidFill>
+        <a:latin typeface="+mn-lt"/>
+        <a:ea typeface="+mn-ea"/>
+        <a:cs typeface="+mn-cs"/>
+      </a:defRPr>
+    </a:lvl9pPr>
+  </p:notesStyle>
+</p:notesMaster>
+</file>
+
+<file path=ppt/notesSlides/notesSlide1.xml><?xml version="1.0" encoding="utf-8"?>
+<p:notes xmlns:a="http://schemas.openxmlformats.org/drawingml/2006/main" xmlns:r="http://schemas.openxmlformats.org/officeDocument/2006/relationships" xmlns:p="http://schemas.openxmlformats.org/presentationml/2006/main">
+  <p:cSld>
+    <p:spTree>
+      <p:nvGrpSpPr>
+        <p:cNvPr id="1" name=""/>
+        <p:cNvGrpSpPr/>
+        <p:nvPr/>
+      </p:nvGrpSpPr>
+      <p:grpSpPr>
+        <a:xfrm>
+          <a:off x="0" y="0"/>
+          <a:ext cx="0" cy="0"/>
+          <a:chOff x="0" y="0"/>
+          <a:chExt cx="0" cy="0"/>
+        </a:xfrm>
+      </p:grpSpPr>
+      <p:sp>
+        <p:nvSpPr>
+          <p:cNvPr id="2" name="Slide Image Placeholder 1"/>
+          <p:cNvSpPr>
+            <a:spLocks noGrp="1" noRot="1" noChangeAspect="1"/>
+          </p:cNvSpPr>
+          <p:nvPr>
+            <p:ph type="sldImg"/>
+          </p:nvPr>
+        </p:nvSpPr>
+        <p:spPr/>
+      </p:sp>
+      <p:sp>
+        <p:nvSpPr>
+          <p:cNvPr id="3" name="Notes Placeholder 2"/>
+          <p:cNvSpPr>
+            <a:spLocks noGrp="1"/>
+          </p:cNvSpPr>
+          <p:nvPr>
+            <p:ph type="body" idx="1"/>
+          </p:nvPr>
+        </p:nvSpPr>
+        <p:spPr/>
+        <p:txBody>
+          <a:bodyPr/>
+          <a:lstStyle/>
+          <a:p>
+            <a:br>
+              <a:rPr lang="en-US" dirty="0">
+                <a:latin typeface="Menlo" panose="020B0609030804020204" pitchFamily="49" charset="0"/>
+                <a:ea typeface="Menlo" panose="020B0609030804020204" pitchFamily="49" charset="0"/>
+                <a:cs typeface="Menlo" panose="020B0609030804020204" pitchFamily="49" charset="0"/>
+              </a:rPr>
+            </a:br>
+            <a:r>
+              <a:rPr lang="en-US" dirty="0" err="1">
+                <a:latin typeface="Menlo" panose="020B0609030804020204" pitchFamily="49" charset="0"/>
+                <a:ea typeface="Menlo" panose="020B0609030804020204" pitchFamily="49" charset="0"/>
+                <a:cs typeface="Menlo" panose="020B0609030804020204" pitchFamily="49" charset="0"/>
+              </a:rPr>
+              <a:t>model.compile</a:t>
+            </a:r>
+            <a:r>
+              <a:rPr lang="en-US" dirty="0">
+                <a:latin typeface="Menlo" panose="020B0609030804020204" pitchFamily="49" charset="0"/>
+                <a:ea typeface="Menlo" panose="020B0609030804020204" pitchFamily="49" charset="0"/>
+                <a:cs typeface="Menlo" panose="020B0609030804020204" pitchFamily="49" charset="0"/>
+              </a:rPr>
+              <a:t>(loss='</a:t>
+            </a:r>
+            <a:r>
+              <a:rPr lang="en-US" dirty="0" err="1">
+                <a:latin typeface="Menlo" panose="020B0609030804020204" pitchFamily="49" charset="0"/>
+                <a:ea typeface="Menlo" panose="020B0609030804020204" pitchFamily="49" charset="0"/>
+                <a:cs typeface="Menlo" panose="020B0609030804020204" pitchFamily="49" charset="0"/>
+              </a:rPr>
+              <a:t>mean_squared_error</a:t>
+            </a:r>
+            <a:r>
+              <a:rPr lang="en-US" dirty="0">
+                <a:latin typeface="Menlo" panose="020B0609030804020204" pitchFamily="49" charset="0"/>
+                <a:ea typeface="Menlo" panose="020B0609030804020204" pitchFamily="49" charset="0"/>
+                <a:cs typeface="Menlo" panose="020B0609030804020204" pitchFamily="49" charset="0"/>
+              </a:rPr>
+              <a:t>', </a:t>
+            </a:r>
+          </a:p>
+          <a:p>
+            <a:r>
+              <a:rPr lang="en-US" dirty="0">
+                <a:latin typeface="Menlo" panose="020B0609030804020204" pitchFamily="49" charset="0"/>
+                <a:ea typeface="Menlo" panose="020B0609030804020204" pitchFamily="49" charset="0"/>
+                <a:cs typeface="Menlo" panose="020B0609030804020204" pitchFamily="49" charset="0"/>
+              </a:rPr>
+              <a:t>optimizer=</a:t>
+            </a:r>
+            <a:r>
+              <a:rPr lang="en-US" dirty="0" err="1">
+                <a:latin typeface="Menlo" panose="020B0609030804020204" pitchFamily="49" charset="0"/>
+                <a:ea typeface="Menlo" panose="020B0609030804020204" pitchFamily="49" charset="0"/>
+                <a:cs typeface="Menlo" panose="020B0609030804020204" pitchFamily="49" charset="0"/>
+              </a:rPr>
+              <a:t>tf.keras.optimizers.Adam</a:t>
+            </a:r>
+            <a:r>
+              <a:rPr lang="en-US" dirty="0">
+                <a:latin typeface="Menlo" panose="020B0609030804020204" pitchFamily="49" charset="0"/>
+                <a:ea typeface="Menlo" panose="020B0609030804020204" pitchFamily="49" charset="0"/>
+                <a:cs typeface="Menlo" panose="020B0609030804020204" pitchFamily="49" charset="0"/>
+              </a:rPr>
+              <a:t>(0.1))</a:t>
+            </a:r>
+          </a:p>
+          <a:p>
+            <a:br>
+              <a:rPr lang="en-US" dirty="0">
+                <a:latin typeface="Menlo" panose="020B0609030804020204" pitchFamily="49" charset="0"/>
+                <a:ea typeface="Menlo" panose="020B0609030804020204" pitchFamily="49" charset="0"/>
+                <a:cs typeface="Menlo" panose="020B0609030804020204" pitchFamily="49" charset="0"/>
+              </a:rPr>
+            </a:br>
+            <a:br>
+              <a:rPr lang="en-US" dirty="0">
+                <a:latin typeface="Menlo" panose="020B0609030804020204" pitchFamily="49" charset="0"/>
+                <a:ea typeface="Menlo" panose="020B0609030804020204" pitchFamily="49" charset="0"/>
+                <a:cs typeface="Menlo" panose="020B0609030804020204" pitchFamily="49" charset="0"/>
+              </a:rPr>
+            </a:br>
+            <a:r>
+              <a:rPr lang="en-US" dirty="0">
+                <a:latin typeface="Menlo" panose="020B0609030804020204" pitchFamily="49" charset="0"/>
+                <a:ea typeface="Menlo" panose="020B0609030804020204" pitchFamily="49" charset="0"/>
+                <a:cs typeface="Menlo" panose="020B0609030804020204" pitchFamily="49" charset="0"/>
+              </a:rPr>
+              <a:t>history = </a:t>
+            </a:r>
+            <a:r>
+              <a:rPr lang="en-US" dirty="0" err="1">
+                <a:latin typeface="Menlo" panose="020B0609030804020204" pitchFamily="49" charset="0"/>
+                <a:ea typeface="Menlo" panose="020B0609030804020204" pitchFamily="49" charset="0"/>
+                <a:cs typeface="Menlo" panose="020B0609030804020204" pitchFamily="49" charset="0"/>
+              </a:rPr>
+              <a:t>model.fit</a:t>
+            </a:r>
+            <a:r>
+              <a:rPr lang="en-US" dirty="0">
+                <a:latin typeface="Menlo" panose="020B0609030804020204" pitchFamily="49" charset="0"/>
+                <a:ea typeface="Menlo" panose="020B0609030804020204" pitchFamily="49" charset="0"/>
+                <a:cs typeface="Menlo" panose="020B0609030804020204" pitchFamily="49" charset="0"/>
+              </a:rPr>
+              <a:t>(</a:t>
+            </a:r>
+            <a:r>
+              <a:rPr lang="en-US" dirty="0" err="1">
+                <a:latin typeface="Menlo" panose="020B0609030804020204" pitchFamily="49" charset="0"/>
+                <a:ea typeface="Menlo" panose="020B0609030804020204" pitchFamily="49" charset="0"/>
+                <a:cs typeface="Menlo" panose="020B0609030804020204" pitchFamily="49" charset="0"/>
+              </a:rPr>
+              <a:t>celsius_q</a:t>
+            </a:r>
+            <a:r>
+              <a:rPr lang="en-US" dirty="0">
+                <a:latin typeface="Menlo" panose="020B0609030804020204" pitchFamily="49" charset="0"/>
+                <a:ea typeface="Menlo" panose="020B0609030804020204" pitchFamily="49" charset="0"/>
+                <a:cs typeface="Menlo" panose="020B0609030804020204" pitchFamily="49" charset="0"/>
+              </a:rPr>
+              <a:t>, </a:t>
+            </a:r>
+          </a:p>
+          <a:p>
+            <a:r>
+              <a:rPr lang="en-US" dirty="0" err="1">
+                <a:latin typeface="Menlo" panose="020B0609030804020204" pitchFamily="49" charset="0"/>
+                <a:ea typeface="Menlo" panose="020B0609030804020204" pitchFamily="49" charset="0"/>
+                <a:cs typeface="Menlo" panose="020B0609030804020204" pitchFamily="49" charset="0"/>
+              </a:rPr>
+              <a:t>fahrenheit_a</a:t>
+            </a:r>
+            <a:r>
+              <a:rPr lang="en-US" dirty="0">
+                <a:latin typeface="Menlo" panose="020B0609030804020204" pitchFamily="49" charset="0"/>
+                <a:ea typeface="Menlo" panose="020B0609030804020204" pitchFamily="49" charset="0"/>
+                <a:cs typeface="Menlo" panose="020B0609030804020204" pitchFamily="49" charset="0"/>
+              </a:rPr>
+              <a:t>, </a:t>
+            </a:r>
+          </a:p>
+          <a:p>
+            <a:r>
+              <a:rPr lang="en-US" dirty="0">
+                <a:latin typeface="Menlo" panose="020B0609030804020204" pitchFamily="49" charset="0"/>
+                <a:ea typeface="Menlo" panose="020B0609030804020204" pitchFamily="49" charset="0"/>
+                <a:cs typeface="Menlo" panose="020B0609030804020204" pitchFamily="49" charset="0"/>
+              </a:rPr>
+              <a:t>epochs=500, </a:t>
+            </a:r>
+          </a:p>
+          <a:p>
+            <a:r>
+              <a:rPr lang="en-US" dirty="0">
+                <a:latin typeface="Menlo" panose="020B0609030804020204" pitchFamily="49" charset="0"/>
+                <a:ea typeface="Menlo" panose="020B0609030804020204" pitchFamily="49" charset="0"/>
+                <a:cs typeface="Menlo" panose="020B0609030804020204" pitchFamily="49" charset="0"/>
+              </a:rPr>
+              <a:t>verbose=False)</a:t>
+            </a:r>
+          </a:p>
+          <a:p>
+            <a:br>
+              <a:rPr lang="en-US" dirty="0">
+                <a:latin typeface="Menlo" panose="020B0609030804020204" pitchFamily="49" charset="0"/>
+                <a:ea typeface="Menlo" panose="020B0609030804020204" pitchFamily="49" charset="0"/>
+                <a:cs typeface="Menlo" panose="020B0609030804020204" pitchFamily="49" charset="0"/>
+              </a:rPr>
+            </a:br>
+            <a:r>
+              <a:rPr lang="en-US" dirty="0">
+                <a:latin typeface="Menlo" panose="020B0609030804020204" pitchFamily="49" charset="0"/>
+                <a:ea typeface="Menlo" panose="020B0609030804020204" pitchFamily="49" charset="0"/>
+                <a:cs typeface="Menlo" panose="020B0609030804020204" pitchFamily="49" charset="0"/>
+              </a:rPr>
+              <a:t>print("Finished training the model")</a:t>
+            </a:r>
+          </a:p>
+          <a:p>
+            <a:br>
+              <a:rPr lang="en-US" dirty="0">
+                <a:latin typeface="Menlo" panose="020B0609030804020204" pitchFamily="49" charset="0"/>
+                <a:ea typeface="Menlo" panose="020B0609030804020204" pitchFamily="49" charset="0"/>
+                <a:cs typeface="Menlo" panose="020B0609030804020204" pitchFamily="49" charset="0"/>
+              </a:rPr>
+            </a:br>
+            <a:r>
+              <a:rPr lang="en-US" dirty="0">
+                <a:latin typeface="Menlo" panose="020B0609030804020204" pitchFamily="49" charset="0"/>
+                <a:ea typeface="Menlo" panose="020B0609030804020204" pitchFamily="49" charset="0"/>
+                <a:cs typeface="Menlo" panose="020B0609030804020204" pitchFamily="49" charset="0"/>
+              </a:rPr>
+              <a:t>print(</a:t>
+            </a:r>
+            <a:r>
+              <a:rPr lang="en-US" dirty="0" err="1">
+                <a:latin typeface="Menlo" panose="020B0609030804020204" pitchFamily="49" charset="0"/>
+                <a:ea typeface="Menlo" panose="020B0609030804020204" pitchFamily="49" charset="0"/>
+                <a:cs typeface="Menlo" panose="020B0609030804020204" pitchFamily="49" charset="0"/>
+              </a:rPr>
+              <a:t>model.predict</a:t>
+            </a:r>
+            <a:r>
+              <a:rPr lang="en-US" dirty="0">
+                <a:latin typeface="Menlo" panose="020B0609030804020204" pitchFamily="49" charset="0"/>
+                <a:ea typeface="Menlo" panose="020B0609030804020204" pitchFamily="49" charset="0"/>
+                <a:cs typeface="Menlo" panose="020B0609030804020204" pitchFamily="49" charset="0"/>
+              </a:rPr>
+              <a:t>([100.0]))</a:t>
+            </a:r>
+          </a:p>
+          <a:p>
+            <a:br>
+              <a:rPr lang="en-US" dirty="0">
+                <a:latin typeface="Menlo" panose="020B0609030804020204" pitchFamily="49" charset="0"/>
+                <a:ea typeface="Menlo" panose="020B0609030804020204" pitchFamily="49" charset="0"/>
+                <a:cs typeface="Menlo" panose="020B0609030804020204" pitchFamily="49" charset="0"/>
+              </a:rPr>
+            </a:br>
+            <a:r>
+              <a:rPr lang="en-US" dirty="0">
+                <a:latin typeface="Menlo" panose="020B0609030804020204" pitchFamily="49" charset="0"/>
+                <a:ea typeface="Menlo" panose="020B0609030804020204" pitchFamily="49" charset="0"/>
+                <a:cs typeface="Menlo" panose="020B0609030804020204" pitchFamily="49" charset="0"/>
+              </a:rPr>
+              <a:t>print("Model predicts that 100 degrees Celsius is: {} degrees </a:t>
+            </a:r>
+            <a:r>
+              <a:rPr lang="en-US" dirty="0" err="1">
+                <a:latin typeface="Menlo" panose="020B0609030804020204" pitchFamily="49" charset="0"/>
+                <a:ea typeface="Menlo" panose="020B0609030804020204" pitchFamily="49" charset="0"/>
+                <a:cs typeface="Menlo" panose="020B0609030804020204" pitchFamily="49" charset="0"/>
+              </a:rPr>
+              <a:t>Fahrenheit".format</a:t>
+            </a:r>
+            <a:r>
+              <a:rPr lang="en-US" dirty="0">
+                <a:latin typeface="Menlo" panose="020B0609030804020204" pitchFamily="49" charset="0"/>
+                <a:ea typeface="Menlo" panose="020B0609030804020204" pitchFamily="49" charset="0"/>
+                <a:cs typeface="Menlo" panose="020B0609030804020204" pitchFamily="49" charset="0"/>
+              </a:rPr>
+              <a:t>(</a:t>
+            </a:r>
+            <a:r>
+              <a:rPr lang="en-US" dirty="0" err="1">
+                <a:latin typeface="Menlo" panose="020B0609030804020204" pitchFamily="49" charset="0"/>
+                <a:ea typeface="Menlo" panose="020B0609030804020204" pitchFamily="49" charset="0"/>
+                <a:cs typeface="Menlo" panose="020B0609030804020204" pitchFamily="49" charset="0"/>
+              </a:rPr>
+              <a:t>model.predict</a:t>
+            </a:r>
+            <a:r>
+              <a:rPr lang="en-US" dirty="0">
+                <a:latin typeface="Menlo" panose="020B0609030804020204" pitchFamily="49" charset="0"/>
+                <a:ea typeface="Menlo" panose="020B0609030804020204" pitchFamily="49" charset="0"/>
+                <a:cs typeface="Menlo" panose="020B0609030804020204" pitchFamily="49" charset="0"/>
+              </a:rPr>
+              <a:t>([100.0])))</a:t>
+            </a:r>
+          </a:p>
+          <a:p>
+            <a:endParaRPr lang="en-US" dirty="0"/>
+          </a:p>
+        </p:txBody>
+      </p:sp>
+      <p:sp>
+        <p:nvSpPr>
+          <p:cNvPr id="4" name="Slide Number Placeholder 3"/>
+          <p:cNvSpPr>
+            <a:spLocks noGrp="1"/>
+          </p:cNvSpPr>
+          <p:nvPr>
+            <p:ph type="sldNum" sz="quarter" idx="5"/>
+          </p:nvPr>
+        </p:nvSpPr>
+        <p:spPr/>
+        <p:txBody>
+          <a:bodyPr/>
+          <a:lstStyle/>
+          <a:p>
+            <a:fld id="{D1D7FD47-4321-7A46-9D4D-236AB1C0A7AE}" type="slidenum">
+              <a:rPr lang="en-US" smtClean="0"/>
+              <a:t>18</a:t>
+            </a:fld>
+            <a:endParaRPr lang="en-US"/>
+          </a:p>
+        </p:txBody>
+      </p:sp>
+    </p:spTree>
+    <p:extLst>
+      <p:ext uri="{BB962C8B-B14F-4D97-AF65-F5344CB8AC3E}">
+        <p14:creationId xmlns:p14="http://schemas.microsoft.com/office/powerpoint/2010/main" val="168940672"/>
+      </p:ext>
+    </p:extLst>
+  </p:cSld>
+  <p:clrMapOvr>
+    <a:masterClrMapping/>
+  </p:clrMapOvr>
+</p:notes>
 </file>
 
 <file path=ppt/slideLayouts/slideLayout1.xml><?xml version="1.0" encoding="utf-8"?>
@@ -10000,6 +10697,382 @@
 </p:sld>
 </file>
 
+<file path=ppt/slides/slide18.xml><?xml version="1.0" encoding="utf-8"?>
+<p:sld xmlns:a="http://schemas.openxmlformats.org/drawingml/2006/main" xmlns:r="http://schemas.openxmlformats.org/officeDocument/2006/relationships" xmlns:p="http://schemas.openxmlformats.org/presentationml/2006/main">
+  <p:cSld>
+    <p:spTree>
+      <p:nvGrpSpPr>
+        <p:cNvPr id="1" name=""/>
+        <p:cNvGrpSpPr/>
+        <p:nvPr/>
+      </p:nvGrpSpPr>
+      <p:grpSpPr>
+        <a:xfrm>
+          <a:off x="0" y="0"/>
+          <a:ext cx="0" cy="0"/>
+          <a:chOff x="0" y="0"/>
+          <a:chExt cx="0" cy="0"/>
+        </a:xfrm>
+      </p:grpSpPr>
+      <p:sp>
+        <p:nvSpPr>
+          <p:cNvPr id="4" name="TextBox 3">
+            <a:extLst>
+              <a:ext uri="{FF2B5EF4-FFF2-40B4-BE49-F238E27FC236}">
+                <a16:creationId xmlns:a16="http://schemas.microsoft.com/office/drawing/2014/main" id="{533CDE1A-DD5A-7B48-A392-BA1B2191ECA4}"/>
+              </a:ext>
+            </a:extLst>
+          </p:cNvPr>
+          <p:cNvSpPr txBox="1"/>
+          <p:nvPr/>
+        </p:nvSpPr>
+        <p:spPr>
+          <a:xfrm>
+            <a:off x="896353" y="673768"/>
+            <a:ext cx="7436651" cy="1477328"/>
+          </a:xfrm>
+          <a:prstGeom prst="rect">
+            <a:avLst/>
+          </a:prstGeom>
+          <a:noFill/>
+        </p:spPr>
+        <p:txBody>
+          <a:bodyPr wrap="none" rtlCol="0">
+            <a:spAutoFit/>
+          </a:bodyPr>
+          <a:lstStyle/>
+          <a:p>
+            <a:r>
+              <a:rPr lang="en-US" dirty="0">
+                <a:latin typeface="Menlo" panose="020B0609030804020204" pitchFamily="49" charset="0"/>
+                <a:ea typeface="Menlo" panose="020B0609030804020204" pitchFamily="49" charset="0"/>
+                <a:cs typeface="Menlo" panose="020B0609030804020204" pitchFamily="49" charset="0"/>
+              </a:rPr>
+              <a:t>model = </a:t>
+            </a:r>
+            <a:r>
+              <a:rPr lang="en-US" dirty="0" err="1">
+                <a:latin typeface="Menlo" panose="020B0609030804020204" pitchFamily="49" charset="0"/>
+                <a:ea typeface="Menlo" panose="020B0609030804020204" pitchFamily="49" charset="0"/>
+                <a:cs typeface="Menlo" panose="020B0609030804020204" pitchFamily="49" charset="0"/>
+              </a:rPr>
+              <a:t>tf.keras.Sequential</a:t>
+            </a:r>
+            <a:r>
+              <a:rPr lang="en-US" dirty="0">
+                <a:latin typeface="Menlo" panose="020B0609030804020204" pitchFamily="49" charset="0"/>
+                <a:ea typeface="Menlo" panose="020B0609030804020204" pitchFamily="49" charset="0"/>
+                <a:cs typeface="Menlo" panose="020B0609030804020204" pitchFamily="49" charset="0"/>
+              </a:rPr>
+              <a:t>([</a:t>
+            </a:r>
+          </a:p>
+          <a:p>
+            <a:r>
+              <a:rPr lang="en-US" dirty="0" err="1">
+                <a:latin typeface="Menlo" panose="020B0609030804020204" pitchFamily="49" charset="0"/>
+                <a:ea typeface="Menlo" panose="020B0609030804020204" pitchFamily="49" charset="0"/>
+                <a:cs typeface="Menlo" panose="020B0609030804020204" pitchFamily="49" charset="0"/>
+              </a:rPr>
+              <a:t>tf.keras.layers.Dense</a:t>
+            </a:r>
+            <a:r>
+              <a:rPr lang="en-US" dirty="0">
+                <a:latin typeface="Menlo" panose="020B0609030804020204" pitchFamily="49" charset="0"/>
+                <a:ea typeface="Menlo" panose="020B0609030804020204" pitchFamily="49" charset="0"/>
+                <a:cs typeface="Menlo" panose="020B0609030804020204" pitchFamily="49" charset="0"/>
+              </a:rPr>
+              <a:t>(</a:t>
+            </a:r>
+            <a:r>
+              <a:rPr lang="en-US" dirty="0">
+                <a:solidFill>
+                  <a:srgbClr val="FF0000"/>
+                </a:solidFill>
+                <a:latin typeface="Menlo" panose="020B0609030804020204" pitchFamily="49" charset="0"/>
+                <a:ea typeface="Menlo" panose="020B0609030804020204" pitchFamily="49" charset="0"/>
+                <a:cs typeface="Menlo" panose="020B0609030804020204" pitchFamily="49" charset="0"/>
+              </a:rPr>
+              <a:t>units=50</a:t>
+            </a:r>
+            <a:r>
+              <a:rPr lang="en-US" dirty="0">
+                <a:latin typeface="Menlo" panose="020B0609030804020204" pitchFamily="49" charset="0"/>
+                <a:ea typeface="Menlo" panose="020B0609030804020204" pitchFamily="49" charset="0"/>
+                <a:cs typeface="Menlo" panose="020B0609030804020204" pitchFamily="49" charset="0"/>
+              </a:rPr>
+              <a:t>, </a:t>
+            </a:r>
+            <a:r>
+              <a:rPr lang="en-US" dirty="0" err="1">
+                <a:latin typeface="Menlo" panose="020B0609030804020204" pitchFamily="49" charset="0"/>
+                <a:ea typeface="Menlo" panose="020B0609030804020204" pitchFamily="49" charset="0"/>
+                <a:cs typeface="Menlo" panose="020B0609030804020204" pitchFamily="49" charset="0"/>
+              </a:rPr>
+              <a:t>input_shape</a:t>
+            </a:r>
+            <a:r>
+              <a:rPr lang="en-US" dirty="0">
+                <a:latin typeface="Menlo" panose="020B0609030804020204" pitchFamily="49" charset="0"/>
+                <a:ea typeface="Menlo" panose="020B0609030804020204" pitchFamily="49" charset="0"/>
+                <a:cs typeface="Menlo" panose="020B0609030804020204" pitchFamily="49" charset="0"/>
+              </a:rPr>
+              <a:t>=[12]),</a:t>
+            </a:r>
+          </a:p>
+          <a:p>
+            <a:r>
+              <a:rPr lang="en-US" dirty="0" err="1">
+                <a:latin typeface="Menlo" panose="020B0609030804020204" pitchFamily="49" charset="0"/>
+                <a:ea typeface="Menlo" panose="020B0609030804020204" pitchFamily="49" charset="0"/>
+                <a:cs typeface="Menlo" panose="020B0609030804020204" pitchFamily="49" charset="0"/>
+              </a:rPr>
+              <a:t>tf.keras.layers.Dense</a:t>
+            </a:r>
+            <a:r>
+              <a:rPr lang="en-US" dirty="0">
+                <a:latin typeface="Menlo" panose="020B0609030804020204" pitchFamily="49" charset="0"/>
+                <a:ea typeface="Menlo" panose="020B0609030804020204" pitchFamily="49" charset="0"/>
+                <a:cs typeface="Menlo" panose="020B0609030804020204" pitchFamily="49" charset="0"/>
+              </a:rPr>
+              <a:t>(</a:t>
+            </a:r>
+            <a:r>
+              <a:rPr lang="en-US" dirty="0">
+                <a:solidFill>
+                  <a:srgbClr val="FF0000"/>
+                </a:solidFill>
+                <a:latin typeface="Menlo" panose="020B0609030804020204" pitchFamily="49" charset="0"/>
+                <a:ea typeface="Menlo" panose="020B0609030804020204" pitchFamily="49" charset="0"/>
+                <a:cs typeface="Menlo" panose="020B0609030804020204" pitchFamily="49" charset="0"/>
+              </a:rPr>
+              <a:t>units=70, activation=‘</a:t>
+            </a:r>
+            <a:r>
+              <a:rPr lang="en-US" dirty="0" err="1">
+                <a:solidFill>
+                  <a:srgbClr val="FF0000"/>
+                </a:solidFill>
+                <a:latin typeface="Menlo" panose="020B0609030804020204" pitchFamily="49" charset="0"/>
+                <a:ea typeface="Menlo" panose="020B0609030804020204" pitchFamily="49" charset="0"/>
+                <a:cs typeface="Menlo" panose="020B0609030804020204" pitchFamily="49" charset="0"/>
+              </a:rPr>
+              <a:t>relu</a:t>
+            </a:r>
+            <a:r>
+              <a:rPr lang="en-US" dirty="0">
+                <a:solidFill>
+                  <a:srgbClr val="FF0000"/>
+                </a:solidFill>
+                <a:latin typeface="Menlo" panose="020B0609030804020204" pitchFamily="49" charset="0"/>
+                <a:ea typeface="Menlo" panose="020B0609030804020204" pitchFamily="49" charset="0"/>
+                <a:cs typeface="Menlo" panose="020B0609030804020204" pitchFamily="49" charset="0"/>
+              </a:rPr>
+              <a:t>’</a:t>
+            </a:r>
+            <a:r>
+              <a:rPr lang="en-US" dirty="0">
+                <a:latin typeface="Menlo" panose="020B0609030804020204" pitchFamily="49" charset="0"/>
+                <a:ea typeface="Menlo" panose="020B0609030804020204" pitchFamily="49" charset="0"/>
+                <a:cs typeface="Menlo" panose="020B0609030804020204" pitchFamily="49" charset="0"/>
+              </a:rPr>
+              <a:t>), </a:t>
+            </a:r>
+          </a:p>
+          <a:p>
+            <a:r>
+              <a:rPr lang="en-US" dirty="0" err="1">
+                <a:latin typeface="Menlo" panose="020B0609030804020204" pitchFamily="49" charset="0"/>
+                <a:ea typeface="Menlo" panose="020B0609030804020204" pitchFamily="49" charset="0"/>
+                <a:cs typeface="Menlo" panose="020B0609030804020204" pitchFamily="49" charset="0"/>
+              </a:rPr>
+              <a:t>tf.keras.layers.Dense</a:t>
+            </a:r>
+            <a:r>
+              <a:rPr lang="en-US" dirty="0">
+                <a:latin typeface="Menlo" panose="020B0609030804020204" pitchFamily="49" charset="0"/>
+                <a:ea typeface="Menlo" panose="020B0609030804020204" pitchFamily="49" charset="0"/>
+                <a:cs typeface="Menlo" panose="020B0609030804020204" pitchFamily="49" charset="0"/>
+              </a:rPr>
+              <a:t>(units=1)])</a:t>
+            </a:r>
+          </a:p>
+          <a:p>
+            <a:endParaRPr lang="en-US" dirty="0">
+              <a:latin typeface="Menlo" panose="020B0609030804020204" pitchFamily="49" charset="0"/>
+              <a:ea typeface="Menlo" panose="020B0609030804020204" pitchFamily="49" charset="0"/>
+              <a:cs typeface="Menlo" panose="020B0609030804020204" pitchFamily="49" charset="0"/>
+            </a:endParaRPr>
+          </a:p>
+        </p:txBody>
+      </p:sp>
+      <p:pic>
+        <p:nvPicPr>
+          <p:cNvPr id="9" name="Picture 2" descr="Dense Neural Network. | Download Scientific Diagram">
+            <a:extLst>
+              <a:ext uri="{FF2B5EF4-FFF2-40B4-BE49-F238E27FC236}">
+                <a16:creationId xmlns:a16="http://schemas.microsoft.com/office/drawing/2014/main" id="{5D45D8E6-6DE6-5842-B3B0-96151615E30F}"/>
+              </a:ext>
+            </a:extLst>
+          </p:cNvPr>
+          <p:cNvPicPr>
+            <a:picLocks noGrp="1" noChangeAspect="1" noChangeArrowheads="1"/>
+          </p:cNvPicPr>
+          <p:nvPr>
+            <p:ph idx="1"/>
+          </p:nvPr>
+        </p:nvPicPr>
+        <p:blipFill>
+          <a:blip r:embed="rId3">
+            <a:extLst>
+              <a:ext uri="{28A0092B-C50C-407E-A947-70E740481C1C}">
+                <a14:useLocalDpi xmlns:a14="http://schemas.microsoft.com/office/drawing/2010/main" val="0"/>
+              </a:ext>
+            </a:extLst>
+          </a:blip>
+          <a:srcRect/>
+          <a:stretch>
+            <a:fillRect/>
+          </a:stretch>
+        </p:blipFill>
+        <p:spPr bwMode="auto">
+          <a:xfrm>
+            <a:off x="3397250" y="1579013"/>
+            <a:ext cx="5397500" cy="2781300"/>
+          </a:xfrm>
+          <a:prstGeom prst="rect">
+            <a:avLst/>
+          </a:prstGeom>
+          <a:noFill/>
+          <a:extLst>
+            <a:ext uri="{909E8E84-426E-40DD-AFC4-6F175D3DCCD1}">
+              <a14:hiddenFill xmlns:a14="http://schemas.microsoft.com/office/drawing/2010/main">
+                <a:solidFill>
+                  <a:srgbClr val="FFFFFF"/>
+                </a:solidFill>
+              </a14:hiddenFill>
+            </a:ext>
+          </a:extLst>
+        </p:spPr>
+      </p:pic>
+      <p:sp>
+        <p:nvSpPr>
+          <p:cNvPr id="10" name="TextBox 9">
+            <a:extLst>
+              <a:ext uri="{FF2B5EF4-FFF2-40B4-BE49-F238E27FC236}">
+                <a16:creationId xmlns:a16="http://schemas.microsoft.com/office/drawing/2014/main" id="{2B0E94DC-B34D-6145-804D-EBC44F2FD954}"/>
+              </a:ext>
+            </a:extLst>
+          </p:cNvPr>
+          <p:cNvSpPr txBox="1"/>
+          <p:nvPr/>
+        </p:nvSpPr>
+        <p:spPr>
+          <a:xfrm>
+            <a:off x="3597442" y="4084721"/>
+            <a:ext cx="418704" cy="369332"/>
+          </a:xfrm>
+          <a:prstGeom prst="rect">
+            <a:avLst/>
+          </a:prstGeom>
+          <a:noFill/>
+        </p:spPr>
+        <p:txBody>
+          <a:bodyPr wrap="none" rtlCol="0">
+            <a:spAutoFit/>
+          </a:bodyPr>
+          <a:lstStyle/>
+          <a:p>
+            <a:r>
+              <a:rPr lang="en-US" dirty="0"/>
+              <a:t>12</a:t>
+            </a:r>
+          </a:p>
+        </p:txBody>
+      </p:sp>
+      <p:sp>
+        <p:nvSpPr>
+          <p:cNvPr id="12" name="TextBox 11">
+            <a:extLst>
+              <a:ext uri="{FF2B5EF4-FFF2-40B4-BE49-F238E27FC236}">
+                <a16:creationId xmlns:a16="http://schemas.microsoft.com/office/drawing/2014/main" id="{45470E82-4747-2C4E-BA28-FAD1AED673B8}"/>
+              </a:ext>
+            </a:extLst>
+          </p:cNvPr>
+          <p:cNvSpPr txBox="1"/>
+          <p:nvPr/>
+        </p:nvSpPr>
+        <p:spPr>
+          <a:xfrm>
+            <a:off x="5013924" y="4453508"/>
+            <a:ext cx="418704" cy="369332"/>
+          </a:xfrm>
+          <a:prstGeom prst="rect">
+            <a:avLst/>
+          </a:prstGeom>
+          <a:noFill/>
+        </p:spPr>
+        <p:txBody>
+          <a:bodyPr wrap="none" rtlCol="0">
+            <a:spAutoFit/>
+          </a:bodyPr>
+          <a:lstStyle/>
+          <a:p>
+            <a:r>
+              <a:rPr lang="en-US" dirty="0"/>
+              <a:t>50</a:t>
+            </a:r>
+          </a:p>
+        </p:txBody>
+      </p:sp>
+      <p:sp>
+        <p:nvSpPr>
+          <p:cNvPr id="13" name="TextBox 12">
+            <a:extLst>
+              <a:ext uri="{FF2B5EF4-FFF2-40B4-BE49-F238E27FC236}">
+                <a16:creationId xmlns:a16="http://schemas.microsoft.com/office/drawing/2014/main" id="{DC2326EC-082A-2B49-8B68-DD437C80342C}"/>
+              </a:ext>
+            </a:extLst>
+          </p:cNvPr>
+          <p:cNvSpPr txBox="1"/>
+          <p:nvPr/>
+        </p:nvSpPr>
+        <p:spPr>
+          <a:xfrm>
+            <a:off x="6550022" y="4453508"/>
+            <a:ext cx="418704" cy="369332"/>
+          </a:xfrm>
+          <a:prstGeom prst="rect">
+            <a:avLst/>
+          </a:prstGeom>
+          <a:noFill/>
+        </p:spPr>
+        <p:txBody>
+          <a:bodyPr wrap="none" rtlCol="0">
+            <a:spAutoFit/>
+          </a:bodyPr>
+          <a:lstStyle/>
+          <a:p>
+            <a:r>
+              <a:rPr lang="en-US" dirty="0"/>
+              <a:t>70</a:t>
+            </a:r>
+          </a:p>
+        </p:txBody>
+      </p:sp>
+    </p:spTree>
+    <p:extLst>
+      <p:ext uri="{BB962C8B-B14F-4D97-AF65-F5344CB8AC3E}">
+        <p14:creationId xmlns:p14="http://schemas.microsoft.com/office/powerpoint/2010/main" val="196906406"/>
+      </p:ext>
+    </p:extLst>
+  </p:cSld>
+  <p:clrMapOvr>
+    <a:masterClrMapping/>
+  </p:clrMapOvr>
+</p:sld>
+</file>
+
 <file path=ppt/slides/slide2.xml><?xml version="1.0" encoding="utf-8"?>
 <p:sld xmlns:a="http://schemas.openxmlformats.org/drawingml/2006/main" xmlns:r="http://schemas.openxmlformats.org/officeDocument/2006/relationships" xmlns:p="http://schemas.openxmlformats.org/presentationml/2006/main">
   <p:cSld>
@@ -11150,8 +12223,8 @@
         </p:blipFill>
         <p:spPr>
           <a:xfrm>
-            <a:off x="9111150" y="1329252"/>
-            <a:ext cx="3080850" cy="2090800"/>
+            <a:off x="8604422" y="1329252"/>
+            <a:ext cx="3587578" cy="2434688"/>
           </a:xfrm>
           <a:prstGeom prst="rect">
             <a:avLst/>
@@ -11264,7 +12337,11 @@
           <a:lstStyle/>
           <a:p>
             <a:r>
-              <a:rPr lang="en-US" b="1" dirty="0"/>
+              <a:rPr lang="en-US" b="1" dirty="0">
+                <a:highlight>
+                  <a:srgbClr val="FF0000"/>
+                </a:highlight>
+              </a:rPr>
               <a:t>Output Layer</a:t>
             </a:r>
           </a:p>
@@ -12085,7 +13162,11 @@
           <a:lstStyle/>
           <a:p>
             <a:r>
-              <a:rPr lang="en-US" dirty="0"/>
+              <a:rPr lang="en-US" dirty="0">
+                <a:highlight>
+                  <a:srgbClr val="00FF00"/>
+                </a:highlight>
+              </a:rPr>
               <a:t>Actual Output</a:t>
             </a:r>
           </a:p>
@@ -12133,8 +13214,8 @@
           </a:p>
         </p:txBody>
       </p:sp>
-      <mc:AlternateContent xmlns:mc="http://schemas.openxmlformats.org/markup-compatibility/2006" xmlns:a14="http://schemas.microsoft.com/office/drawing/2010/main">
-        <mc:Choice Requires="a14">
+      <mc:AlternateContent xmlns:mc="http://schemas.openxmlformats.org/markup-compatibility/2006">
+        <mc:Choice xmlns:a14="http://schemas.microsoft.com/office/drawing/2010/main" Requires="a14">
           <p:sp>
             <p:nvSpPr>
               <p:cNvPr id="24" name="TextBox 23">
@@ -12215,6 +13296,9 @@
                         <m:sSubPr>
                           <m:ctrlPr>
                             <a:rPr lang="en-US" b="0" i="1" dirty="0" smtClean="0">
+                              <a:highlight>
+                                <a:srgbClr val="FFFF00"/>
+                              </a:highlight>
                               <a:latin typeface="Cambria Math" panose="02040503050406030204" pitchFamily="18" charset="0"/>
                             </a:rPr>
                           </m:ctrlPr>
@@ -12222,6 +13306,9 @@
                         <m:e>
                           <m:r>
                             <a:rPr lang="en-US" b="0" i="1" dirty="0" smtClean="0">
+                              <a:highlight>
+                                <a:srgbClr val="FFFF00"/>
+                              </a:highlight>
                               <a:latin typeface="Cambria Math" panose="02040503050406030204" pitchFamily="18" charset="0"/>
                             </a:rPr>
                             <m:t>𝑤</m:t>
@@ -12230,6 +13317,9 @@
                         <m:sub>
                           <m:r>
                             <a:rPr lang="en-US" b="0" i="1" dirty="0" smtClean="0">
+                              <a:highlight>
+                                <a:srgbClr val="FFFF00"/>
+                              </a:highlight>
                               <a:latin typeface="Cambria Math" panose="02040503050406030204" pitchFamily="18" charset="0"/>
                             </a:rPr>
                             <m:t>𝑖</m:t>
@@ -12238,6 +13328,9 @@
                             <m:sSubPr>
                               <m:ctrlPr>
                                 <a:rPr lang="en-US" b="0" i="1" dirty="0" smtClean="0">
+                                  <a:highlight>
+                                    <a:srgbClr val="FFFF00"/>
+                                  </a:highlight>
                                   <a:latin typeface="Cambria Math" panose="02040503050406030204" pitchFamily="18" charset="0"/>
                                 </a:rPr>
                               </m:ctrlPr>
@@ -12245,6 +13338,9 @@
                             <m:e>
                               <m:r>
                                 <a:rPr lang="en-US" b="0" i="1" dirty="0" smtClean="0">
+                                  <a:highlight>
+                                    <a:srgbClr val="FFFF00"/>
+                                  </a:highlight>
                                   <a:latin typeface="Cambria Math" panose="02040503050406030204" pitchFamily="18" charset="0"/>
                                 </a:rPr>
                                 <m:t>𝑡</m:t>
@@ -12253,6 +13349,9 @@
                             <m:sub>
                               <m:r>
                                 <a:rPr lang="en-US" b="0" i="1" dirty="0" smtClean="0">
+                                  <a:highlight>
+                                    <a:srgbClr val="FFFF00"/>
+                                  </a:highlight>
                                   <a:latin typeface="Cambria Math" panose="02040503050406030204" pitchFamily="18" charset="0"/>
                                 </a:rPr>
                                 <m:t>1</m:t>
@@ -12283,6 +13382,9 @@
                         <m:sSubPr>
                           <m:ctrlPr>
                             <a:rPr lang="en-US" i="1" dirty="0">
+                              <a:highlight>
+                                <a:srgbClr val="FFFF00"/>
+                              </a:highlight>
                               <a:latin typeface="Cambria Math" panose="02040503050406030204" pitchFamily="18" charset="0"/>
                             </a:rPr>
                           </m:ctrlPr>
@@ -12290,6 +13392,9 @@
                         <m:e>
                           <m:r>
                             <a:rPr lang="en-US" b="0" i="1" dirty="0" smtClean="0">
+                              <a:highlight>
+                                <a:srgbClr val="FFFF00"/>
+                              </a:highlight>
                               <a:latin typeface="Cambria Math" panose="02040503050406030204" pitchFamily="18" charset="0"/>
                             </a:rPr>
                             <m:t>𝑏</m:t>
@@ -12298,6 +13403,9 @@
                         <m:sub>
                           <m:r>
                             <a:rPr lang="en-US" b="0" i="1" dirty="0" smtClean="0">
+                              <a:highlight>
+                                <a:srgbClr val="FFFF00"/>
+                              </a:highlight>
                               <a:latin typeface="Cambria Math" panose="02040503050406030204" pitchFamily="18" charset="0"/>
                             </a:rPr>
                             <m:t>1</m:t>
@@ -12307,12 +13415,16 @@
                     </m:oMath>
                   </m:oMathPara>
                 </a14:m>
-                <a:endParaRPr lang="en-US" dirty="0"/>
+                <a:endParaRPr lang="en-US" dirty="0">
+                  <a:highlight>
+                    <a:srgbClr val="FFFF00"/>
+                  </a:highlight>
+                </a:endParaRPr>
               </a:p>
             </p:txBody>
           </p:sp>
         </mc:Choice>
-        <mc:Fallback xmlns="">
+        <mc:Fallback>
           <p:sp>
             <p:nvSpPr>
               <p:cNvPr id="24" name="TextBox 23">
@@ -12526,7 +13638,11 @@
           <a:lstStyle/>
           <a:p>
             <a:r>
-              <a:rPr lang="en-US" dirty="0"/>
+              <a:rPr lang="en-US" dirty="0">
+                <a:highlight>
+                  <a:srgbClr val="FFFF00"/>
+                </a:highlight>
+              </a:rPr>
               <a:t>31.4</a:t>
             </a:r>
           </a:p>
@@ -13081,7 +14197,11 @@
           <a:lstStyle/>
           <a:p>
             <a:r>
-              <a:rPr lang="en-US" dirty="0"/>
+              <a:rPr lang="en-US" dirty="0">
+                <a:highlight>
+                  <a:srgbClr val="00FFFF"/>
+                </a:highlight>
+              </a:rPr>
               <a:t>Compute Error</a:t>
             </a:r>
           </a:p>
@@ -13228,7 +14348,11 @@
           <a:lstStyle/>
           <a:p>
             <a:r>
-              <a:rPr lang="en-US" dirty="0"/>
+              <a:rPr lang="en-US" dirty="0">
+                <a:highlight>
+                  <a:srgbClr val="FFFF00"/>
+                </a:highlight>
+              </a:rPr>
               <a:t>Iteration</a:t>
             </a:r>
           </a:p>
@@ -13412,9 +14536,503 @@
           <a:lstStyle/>
           <a:p>
             <a:r>
-              <a:rPr lang="en-US"/>
+              <a:rPr lang="en-US" dirty="0"/>
               <a:t>Back Propagation</a:t>
             </a:r>
+          </a:p>
+        </p:txBody>
+      </p:sp>
+      <p:pic>
+        <p:nvPicPr>
+          <p:cNvPr id="49" name="Picture 4" descr="A picture containing table&#10;&#10;Description automatically generated">
+            <a:extLst>
+              <a:ext uri="{FF2B5EF4-FFF2-40B4-BE49-F238E27FC236}">
+                <a16:creationId xmlns:a16="http://schemas.microsoft.com/office/drawing/2014/main" id="{E74B6BF9-EE81-AA4D-8469-9AF247A73A22}"/>
+              </a:ext>
+            </a:extLst>
+          </p:cNvPr>
+          <p:cNvPicPr>
+            <a:picLocks noChangeAspect="1"/>
+          </p:cNvPicPr>
+          <p:nvPr/>
+        </p:nvPicPr>
+        <p:blipFill rotWithShape="1">
+          <a:blip r:embed="rId10"/>
+          <a:srcRect l="5380" t="16613" r="5380" b="14696"/>
+          <a:stretch/>
+        </p:blipFill>
+        <p:spPr>
+          <a:xfrm>
+            <a:off x="6413541" y="1596153"/>
+            <a:ext cx="2388944" cy="909804"/>
+          </a:xfrm>
+          <a:prstGeom prst="rect">
+            <a:avLst/>
+          </a:prstGeom>
+        </p:spPr>
+      </p:pic>
+      <p:sp>
+        <p:nvSpPr>
+          <p:cNvPr id="6" name="TextBox 5">
+            <a:extLst>
+              <a:ext uri="{FF2B5EF4-FFF2-40B4-BE49-F238E27FC236}">
+                <a16:creationId xmlns:a16="http://schemas.microsoft.com/office/drawing/2014/main" id="{C81FB150-F5A3-2946-8381-B9D761B76A41}"/>
+              </a:ext>
+            </a:extLst>
+          </p:cNvPr>
+          <p:cNvSpPr txBox="1"/>
+          <p:nvPr/>
+        </p:nvSpPr>
+        <p:spPr>
+          <a:xfrm>
+            <a:off x="1488637" y="2768089"/>
+            <a:ext cx="301686" cy="369332"/>
+          </a:xfrm>
+          <a:prstGeom prst="rect">
+            <a:avLst/>
+          </a:prstGeom>
+          <a:noFill/>
+        </p:spPr>
+        <p:txBody>
+          <a:bodyPr wrap="none" rtlCol="0">
+            <a:spAutoFit/>
+          </a:bodyPr>
+          <a:lstStyle/>
+          <a:p>
+            <a:r>
+              <a:rPr lang="en-US" dirty="0"/>
+              <a:t>0</a:t>
+            </a:r>
+          </a:p>
+        </p:txBody>
+      </p:sp>
+      <p:sp>
+        <p:nvSpPr>
+          <p:cNvPr id="7" name="TextBox 6">
+            <a:extLst>
+              <a:ext uri="{FF2B5EF4-FFF2-40B4-BE49-F238E27FC236}">
+                <a16:creationId xmlns:a16="http://schemas.microsoft.com/office/drawing/2014/main" id="{A92975F0-4B12-124D-ADB7-2C3070674586}"/>
+              </a:ext>
+            </a:extLst>
+          </p:cNvPr>
+          <p:cNvSpPr txBox="1"/>
+          <p:nvPr/>
+        </p:nvSpPr>
+        <p:spPr>
+          <a:xfrm>
+            <a:off x="6454083" y="2621425"/>
+            <a:ext cx="1138453" cy="369332"/>
+          </a:xfrm>
+          <a:prstGeom prst="rect">
+            <a:avLst/>
+          </a:prstGeom>
+          <a:noFill/>
+        </p:spPr>
+        <p:txBody>
+          <a:bodyPr wrap="none" rtlCol="0">
+            <a:spAutoFit/>
+          </a:bodyPr>
+          <a:lstStyle/>
+          <a:p>
+            <a:r>
+              <a:rPr lang="en-US" dirty="0"/>
+              <a:t>Label = 32</a:t>
+            </a:r>
+          </a:p>
+        </p:txBody>
+      </p:sp>
+      <p:sp>
+        <p:nvSpPr>
+          <p:cNvPr id="28" name="TextBox 27">
+            <a:extLst>
+              <a:ext uri="{FF2B5EF4-FFF2-40B4-BE49-F238E27FC236}">
+                <a16:creationId xmlns:a16="http://schemas.microsoft.com/office/drawing/2014/main" id="{BF54A627-F17F-AA43-83E1-1C2A16499C62}"/>
+              </a:ext>
+            </a:extLst>
+          </p:cNvPr>
+          <p:cNvSpPr txBox="1"/>
+          <p:nvPr/>
+        </p:nvSpPr>
+        <p:spPr>
+          <a:xfrm>
+            <a:off x="5603056" y="2820184"/>
+            <a:ext cx="593432" cy="369332"/>
+          </a:xfrm>
+          <a:prstGeom prst="rect">
+            <a:avLst/>
+          </a:prstGeom>
+          <a:noFill/>
+        </p:spPr>
+        <p:txBody>
+          <a:bodyPr wrap="none" rtlCol="0">
+            <a:spAutoFit/>
+          </a:bodyPr>
+          <a:lstStyle/>
+          <a:p>
+            <a:r>
+              <a:rPr lang="en-US" dirty="0"/>
+              <a:t>12.1</a:t>
+            </a:r>
+          </a:p>
+        </p:txBody>
+      </p:sp>
+      <p:cxnSp>
+        <p:nvCxnSpPr>
+          <p:cNvPr id="30" name="Straight Arrow Connector 29">
+            <a:extLst>
+              <a:ext uri="{FF2B5EF4-FFF2-40B4-BE49-F238E27FC236}">
+                <a16:creationId xmlns:a16="http://schemas.microsoft.com/office/drawing/2014/main" id="{DE4147CD-7C3F-BB4E-A649-B8E8D692F40A}"/>
+              </a:ext>
+            </a:extLst>
+          </p:cNvPr>
+          <p:cNvCxnSpPr>
+            <a:stCxn id="21" idx="3"/>
+            <a:endCxn id="23" idx="1"/>
+          </p:cNvCxnSpPr>
+          <p:nvPr/>
+        </p:nvCxnSpPr>
+        <p:spPr>
+          <a:xfrm>
+            <a:off x="6132698" y="4918614"/>
+            <a:ext cx="1132399" cy="0"/>
+          </a:xfrm>
+          <a:prstGeom prst="straightConnector1">
+            <a:avLst/>
+          </a:prstGeom>
+          <a:ln>
+            <a:headEnd type="triangle"/>
+            <a:tailEnd type="triangle"/>
+          </a:ln>
+        </p:spPr>
+        <p:style>
+          <a:lnRef idx="1">
+            <a:schemeClr val="accent1"/>
+          </a:lnRef>
+          <a:fillRef idx="0">
+            <a:schemeClr val="accent1"/>
+          </a:fillRef>
+          <a:effectRef idx="0">
+            <a:schemeClr val="accent1"/>
+          </a:effectRef>
+          <a:fontRef idx="minor">
+            <a:schemeClr val="tx1"/>
+          </a:fontRef>
+        </p:style>
+      </p:cxnSp>
+      <p:sp>
+        <p:nvSpPr>
+          <p:cNvPr id="31" name="TextBox 30">
+            <a:extLst>
+              <a:ext uri="{FF2B5EF4-FFF2-40B4-BE49-F238E27FC236}">
+                <a16:creationId xmlns:a16="http://schemas.microsoft.com/office/drawing/2014/main" id="{9AED9E27-F6F4-0947-9413-B08621AD952D}"/>
+              </a:ext>
+            </a:extLst>
+          </p:cNvPr>
+          <p:cNvSpPr txBox="1"/>
+          <p:nvPr/>
+        </p:nvSpPr>
+        <p:spPr>
+          <a:xfrm>
+            <a:off x="9991222" y="4192338"/>
+            <a:ext cx="607859" cy="369332"/>
+          </a:xfrm>
+          <a:prstGeom prst="rect">
+            <a:avLst/>
+          </a:prstGeom>
+          <a:noFill/>
+        </p:spPr>
+        <p:txBody>
+          <a:bodyPr wrap="none" rtlCol="0">
+            <a:spAutoFit/>
+          </a:bodyPr>
+          <a:lstStyle/>
+          <a:p>
+            <a:r>
+              <a:rPr lang="en-US" b="1" dirty="0"/>
+              <a:t>MSE</a:t>
+            </a:r>
+          </a:p>
+        </p:txBody>
+      </p:sp>
+      <p:pic>
+        <p:nvPicPr>
+          <p:cNvPr id="51" name="Picture 8">
+            <a:extLst>
+              <a:ext uri="{FF2B5EF4-FFF2-40B4-BE49-F238E27FC236}">
+                <a16:creationId xmlns:a16="http://schemas.microsoft.com/office/drawing/2014/main" id="{89111C28-03C3-8644-A7D9-C2886DBFBF28}"/>
+              </a:ext>
+            </a:extLst>
+          </p:cNvPr>
+          <p:cNvPicPr>
+            <a:picLocks noChangeAspect="1"/>
+          </p:cNvPicPr>
+          <p:nvPr/>
+        </p:nvPicPr>
+        <p:blipFill>
+          <a:blip r:embed="rId11"/>
+          <a:stretch>
+            <a:fillRect/>
+          </a:stretch>
+        </p:blipFill>
+        <p:spPr>
+          <a:xfrm>
+            <a:off x="132940" y="1323123"/>
+            <a:ext cx="1692710" cy="908894"/>
+          </a:xfrm>
+          <a:prstGeom prst="rect">
+            <a:avLst/>
+          </a:prstGeom>
+          <a:ln w="22225">
+            <a:solidFill>
+              <a:schemeClr val="accent2"/>
+            </a:solidFill>
+          </a:ln>
+        </p:spPr>
+      </p:pic>
+      <p:sp>
+        <p:nvSpPr>
+          <p:cNvPr id="32" name="TextBox 31">
+            <a:extLst>
+              <a:ext uri="{FF2B5EF4-FFF2-40B4-BE49-F238E27FC236}">
+                <a16:creationId xmlns:a16="http://schemas.microsoft.com/office/drawing/2014/main" id="{440D4440-BA2C-D64D-B65F-548E4D3A04DC}"/>
+              </a:ext>
+            </a:extLst>
+          </p:cNvPr>
+          <p:cNvSpPr txBox="1"/>
+          <p:nvPr/>
+        </p:nvSpPr>
+        <p:spPr>
+          <a:xfrm>
+            <a:off x="1058107" y="3158383"/>
+            <a:ext cx="880626" cy="369332"/>
+          </a:xfrm>
+          <a:prstGeom prst="rect">
+            <a:avLst/>
+          </a:prstGeom>
+          <a:noFill/>
+        </p:spPr>
+        <p:txBody>
+          <a:bodyPr wrap="none" rtlCol="0">
+            <a:spAutoFit/>
+          </a:bodyPr>
+          <a:lstStyle/>
+          <a:p>
+            <a:r>
+              <a:rPr lang="en-US" dirty="0">
+                <a:highlight>
+                  <a:srgbClr val="FF00FF"/>
+                </a:highlight>
+              </a:rPr>
+              <a:t>dataset</a:t>
+            </a:r>
+          </a:p>
+        </p:txBody>
+      </p:sp>
+      <p:sp>
+        <p:nvSpPr>
+          <p:cNvPr id="52" name="TextBox 51">
+            <a:extLst>
+              <a:ext uri="{FF2B5EF4-FFF2-40B4-BE49-F238E27FC236}">
+                <a16:creationId xmlns:a16="http://schemas.microsoft.com/office/drawing/2014/main" id="{58128CE6-8DD3-1842-A292-00276AD08370}"/>
+              </a:ext>
+            </a:extLst>
+          </p:cNvPr>
+          <p:cNvSpPr txBox="1"/>
+          <p:nvPr/>
+        </p:nvSpPr>
+        <p:spPr>
+          <a:xfrm>
+            <a:off x="2837048" y="3069242"/>
+            <a:ext cx="780983" cy="369332"/>
+          </a:xfrm>
+          <a:prstGeom prst="rect">
+            <a:avLst/>
+          </a:prstGeom>
+          <a:noFill/>
+        </p:spPr>
+        <p:txBody>
+          <a:bodyPr wrap="none" rtlCol="0">
+            <a:spAutoFit/>
+          </a:bodyPr>
+          <a:lstStyle/>
+          <a:p>
+            <a:r>
+              <a:rPr lang="en-US" dirty="0">
+                <a:highlight>
+                  <a:srgbClr val="FF00FF"/>
+                </a:highlight>
+              </a:rPr>
+              <a:t>model</a:t>
+            </a:r>
+          </a:p>
+        </p:txBody>
+      </p:sp>
+      <p:sp>
+        <p:nvSpPr>
+          <p:cNvPr id="53" name="TextBox 52">
+            <a:extLst>
+              <a:ext uri="{FF2B5EF4-FFF2-40B4-BE49-F238E27FC236}">
+                <a16:creationId xmlns:a16="http://schemas.microsoft.com/office/drawing/2014/main" id="{E1E62FB2-4262-0340-84CB-527CBCED37EA}"/>
+              </a:ext>
+            </a:extLst>
+          </p:cNvPr>
+          <p:cNvSpPr txBox="1"/>
+          <p:nvPr/>
+        </p:nvSpPr>
+        <p:spPr>
+          <a:xfrm>
+            <a:off x="5088686" y="1895067"/>
+            <a:ext cx="1234825" cy="369332"/>
+          </a:xfrm>
+          <a:prstGeom prst="rect">
+            <a:avLst/>
+          </a:prstGeom>
+          <a:noFill/>
+        </p:spPr>
+        <p:txBody>
+          <a:bodyPr wrap="none" rtlCol="0">
+            <a:spAutoFit/>
+          </a:bodyPr>
+          <a:lstStyle/>
+          <a:p>
+            <a:r>
+              <a:rPr lang="en-US" dirty="0">
+                <a:highlight>
+                  <a:srgbClr val="FF00FF"/>
+                </a:highlight>
+              </a:rPr>
+              <a:t>predictions</a:t>
+            </a:r>
+          </a:p>
+        </p:txBody>
+      </p:sp>
+      <p:sp>
+        <p:nvSpPr>
+          <p:cNvPr id="54" name="TextBox 53">
+            <a:extLst>
+              <a:ext uri="{FF2B5EF4-FFF2-40B4-BE49-F238E27FC236}">
+                <a16:creationId xmlns:a16="http://schemas.microsoft.com/office/drawing/2014/main" id="{F88DF2DE-9FA2-B14F-B4A3-E006CE778556}"/>
+              </a:ext>
+            </a:extLst>
+          </p:cNvPr>
+          <p:cNvSpPr txBox="1"/>
+          <p:nvPr/>
+        </p:nvSpPr>
+        <p:spPr>
+          <a:xfrm>
+            <a:off x="6556539" y="2959862"/>
+            <a:ext cx="728084" cy="369332"/>
+          </a:xfrm>
+          <a:prstGeom prst="rect">
+            <a:avLst/>
+          </a:prstGeom>
+          <a:noFill/>
+        </p:spPr>
+        <p:txBody>
+          <a:bodyPr wrap="none" rtlCol="0">
+            <a:spAutoFit/>
+          </a:bodyPr>
+          <a:lstStyle/>
+          <a:p>
+            <a:r>
+              <a:rPr lang="en-US" dirty="0">
+                <a:highlight>
+                  <a:srgbClr val="FF00FF"/>
+                </a:highlight>
+              </a:rPr>
+              <a:t>labels</a:t>
+            </a:r>
+          </a:p>
+        </p:txBody>
+      </p:sp>
+      <p:sp>
+        <p:nvSpPr>
+          <p:cNvPr id="36" name="TextBox 35">
+            <a:extLst>
+              <a:ext uri="{FF2B5EF4-FFF2-40B4-BE49-F238E27FC236}">
+                <a16:creationId xmlns:a16="http://schemas.microsoft.com/office/drawing/2014/main" id="{E0D2CB7D-E2B0-354B-8CE4-D3658AA6BA05}"/>
+              </a:ext>
+            </a:extLst>
+          </p:cNvPr>
+          <p:cNvSpPr txBox="1"/>
+          <p:nvPr/>
+        </p:nvSpPr>
+        <p:spPr>
+          <a:xfrm>
+            <a:off x="10599081" y="4065029"/>
+            <a:ext cx="1422184" cy="369332"/>
+          </a:xfrm>
+          <a:prstGeom prst="rect">
+            <a:avLst/>
+          </a:prstGeom>
+          <a:noFill/>
+        </p:spPr>
+        <p:txBody>
+          <a:bodyPr wrap="none" rtlCol="0">
+            <a:spAutoFit/>
+          </a:bodyPr>
+          <a:lstStyle/>
+          <a:p>
+            <a:r>
+              <a:rPr lang="en-US" dirty="0">
+                <a:highlight>
+                  <a:srgbClr val="FF00FF"/>
+                </a:highlight>
+              </a:rPr>
+              <a:t>Loss function</a:t>
+            </a:r>
+          </a:p>
+        </p:txBody>
+      </p:sp>
+      <p:sp>
+        <p:nvSpPr>
+          <p:cNvPr id="56" name="TextBox 55">
+            <a:extLst>
+              <a:ext uri="{FF2B5EF4-FFF2-40B4-BE49-F238E27FC236}">
+                <a16:creationId xmlns:a16="http://schemas.microsoft.com/office/drawing/2014/main" id="{3EBD2299-781F-DD48-8456-D4717BB1EDE9}"/>
+              </a:ext>
+            </a:extLst>
+          </p:cNvPr>
+          <p:cNvSpPr txBox="1"/>
+          <p:nvPr/>
+        </p:nvSpPr>
+        <p:spPr>
+          <a:xfrm>
+            <a:off x="2905657" y="3694974"/>
+            <a:ext cx="1803955" cy="369332"/>
+          </a:xfrm>
+          <a:prstGeom prst="rect">
+            <a:avLst/>
+          </a:prstGeom>
+          <a:noFill/>
+        </p:spPr>
+        <p:txBody>
+          <a:bodyPr wrap="none" rtlCol="0">
+            <a:spAutoFit/>
+          </a:bodyPr>
+          <a:lstStyle/>
+          <a:p>
+            <a:r>
+              <a:rPr lang="en-US" dirty="0">
+                <a:highlight>
+                  <a:srgbClr val="FF00FF"/>
+                </a:highlight>
+              </a:rPr>
+              <a:t>Parameters, </a:t>
+            </a:r>
+            <a:r>
+              <a:rPr lang="en-US" dirty="0" err="1">
+                <a:highlight>
+                  <a:srgbClr val="FF00FF"/>
+                </a:highlight>
+              </a:rPr>
+              <a:t>w&amp;b</a:t>
+            </a:r>
+            <a:endParaRPr lang="en-US" dirty="0">
+              <a:highlight>
+                <a:srgbClr val="FF00FF"/>
+              </a:highlight>
+            </a:endParaRPr>
           </a:p>
         </p:txBody>
       </p:sp>
@@ -13472,7 +15090,7 @@
         </p:blipFill>
         <p:spPr>
           <a:xfrm>
-            <a:off x="218499" y="68586"/>
+            <a:off x="218499" y="155949"/>
             <a:ext cx="5096749" cy="4351338"/>
           </a:xfrm>
         </p:spPr>
@@ -13595,7 +15213,7 @@
               </a:rPr>
               <a:t>Sigmoid takes a real-valued input and squashes it to range between 0 and 1</a:t>
             </a:r>
-            <a:endParaRPr lang="en-US" sz="1600">
+            <a:endParaRPr lang="en-US" sz="1600" dirty="0">
               <a:latin typeface="Arial"/>
               <a:cs typeface="Arial"/>
             </a:endParaRPr>
@@ -13722,6 +15340,554 @@
             <a:r>
               <a:rPr lang="en-US" dirty="0"/>
               <a:t>Softmax converts the input vector to a probabilistic domain. This is very important for us for the final output layer.</a:t>
+            </a:r>
+          </a:p>
+        </p:txBody>
+      </p:sp>
+      <mc:AlternateContent xmlns:mc="http://schemas.openxmlformats.org/markup-compatibility/2006">
+        <mc:Choice xmlns:a14="http://schemas.microsoft.com/office/drawing/2010/main" Requires="a14">
+          <p:sp>
+            <p:nvSpPr>
+              <p:cNvPr id="7" name="TextBox 6">
+                <a:extLst>
+                  <a:ext uri="{FF2B5EF4-FFF2-40B4-BE49-F238E27FC236}">
+                    <a16:creationId xmlns:a16="http://schemas.microsoft.com/office/drawing/2014/main" id="{043FEF48-F291-2249-AA25-B58E23483191}"/>
+                  </a:ext>
+                </a:extLst>
+              </p:cNvPr>
+              <p:cNvSpPr txBox="1"/>
+              <p:nvPr/>
+            </p:nvSpPr>
+            <p:spPr>
+              <a:xfrm>
+                <a:off x="442639" y="4845738"/>
+                <a:ext cx="3968715" cy="369332"/>
+              </a:xfrm>
+              <a:prstGeom prst="rect">
+                <a:avLst/>
+              </a:prstGeom>
+              <a:noFill/>
+            </p:spPr>
+            <p:txBody>
+              <a:bodyPr wrap="none" rtlCol="0">
+                <a:spAutoFit/>
+              </a:bodyPr>
+              <a:lstStyle/>
+              <a:p>
+                <a14:m>
+                  <m:oMathPara xmlns:m="http://schemas.openxmlformats.org/officeDocument/2006/math">
+                    <m:oMathParaPr>
+                      <m:jc m:val="centerGroup"/>
+                    </m:oMathParaPr>
+                    <m:oMath xmlns:m="http://schemas.openxmlformats.org/officeDocument/2006/math">
+                      <m:sSub>
+                        <m:sSubPr>
+                          <m:ctrlPr>
+                            <a:rPr lang="en-US" b="0" i="1" dirty="0" smtClean="0">
+                              <a:latin typeface="Cambria Math" panose="02040503050406030204" pitchFamily="18" charset="0"/>
+                            </a:rPr>
+                          </m:ctrlPr>
+                        </m:sSubPr>
+                        <m:e>
+                          <m:r>
+                            <a:rPr lang="en-US" i="1" dirty="0" smtClean="0">
+                              <a:latin typeface="Cambria Math" panose="02040503050406030204" pitchFamily="18" charset="0"/>
+                            </a:rPr>
+                            <m:t>𝑋</m:t>
+                          </m:r>
+                        </m:e>
+                        <m:sub>
+                          <m:r>
+                            <a:rPr lang="en-US" i="1" dirty="0" smtClean="0">
+                              <a:latin typeface="Cambria Math" panose="02040503050406030204" pitchFamily="18" charset="0"/>
+                            </a:rPr>
+                            <m:t>1</m:t>
+                          </m:r>
+                        </m:sub>
+                      </m:sSub>
+                      <m:sSub>
+                        <m:sSubPr>
+                          <m:ctrlPr>
+                            <a:rPr lang="en-US" b="0" i="1" dirty="0" smtClean="0">
+                              <a:latin typeface="Cambria Math" panose="02040503050406030204" pitchFamily="18" charset="0"/>
+                            </a:rPr>
+                          </m:ctrlPr>
+                        </m:sSubPr>
+                        <m:e>
+                          <m:r>
+                            <a:rPr lang="en-US" i="1" dirty="0" smtClean="0">
+                              <a:latin typeface="Cambria Math" panose="02040503050406030204" pitchFamily="18" charset="0"/>
+                            </a:rPr>
+                            <m:t>𝑤</m:t>
+                          </m:r>
+                        </m:e>
+                        <m:sub>
+                          <m:r>
+                            <a:rPr lang="en-US" i="1" dirty="0" smtClean="0">
+                              <a:latin typeface="Cambria Math" panose="02040503050406030204" pitchFamily="18" charset="0"/>
+                            </a:rPr>
+                            <m:t>1</m:t>
+                          </m:r>
+                        </m:sub>
+                      </m:sSub>
+                      <m:r>
+                        <a:rPr lang="en-US" i="1" dirty="0" smtClean="0">
+                          <a:latin typeface="Cambria Math" panose="02040503050406030204" pitchFamily="18" charset="0"/>
+                        </a:rPr>
+                        <m:t> + </m:t>
+                      </m:r>
+                      <m:r>
+                        <a:rPr lang="en-US" i="1" dirty="0" smtClean="0">
+                          <a:latin typeface="Cambria Math" panose="02040503050406030204" pitchFamily="18" charset="0"/>
+                        </a:rPr>
+                        <m:t>𝑥</m:t>
+                      </m:r>
+                      <m:r>
+                        <a:rPr lang="en-US" i="1" dirty="0" smtClean="0">
+                          <a:latin typeface="Cambria Math" panose="02040503050406030204" pitchFamily="18" charset="0"/>
+                        </a:rPr>
+                        <m:t>2</m:t>
+                      </m:r>
+                      <m:r>
+                        <a:rPr lang="en-US" i="1" dirty="0" smtClean="0">
+                          <a:latin typeface="Cambria Math" panose="02040503050406030204" pitchFamily="18" charset="0"/>
+                        </a:rPr>
+                        <m:t>𝑤</m:t>
+                      </m:r>
+                      <m:r>
+                        <a:rPr lang="en-US" i="1" dirty="0" smtClean="0">
+                          <a:latin typeface="Cambria Math" panose="02040503050406030204" pitchFamily="18" charset="0"/>
+                        </a:rPr>
+                        <m:t>2 + … + </m:t>
+                      </m:r>
+                      <m:r>
+                        <a:rPr lang="en-US" i="1" dirty="0" err="1" smtClean="0">
+                          <a:latin typeface="Cambria Math" panose="02040503050406030204" pitchFamily="18" charset="0"/>
+                        </a:rPr>
+                        <m:t>𝑥𝑛𝑤𝑛</m:t>
+                      </m:r>
+                      <m:r>
+                        <a:rPr lang="en-US" i="1" dirty="0" smtClean="0">
+                          <a:latin typeface="Cambria Math" panose="02040503050406030204" pitchFamily="18" charset="0"/>
+                        </a:rPr>
+                        <m:t> + </m:t>
+                      </m:r>
+                      <m:r>
+                        <a:rPr lang="en-US" i="1" dirty="0" smtClean="0">
+                          <a:latin typeface="Cambria Math" panose="02040503050406030204" pitchFamily="18" charset="0"/>
+                        </a:rPr>
+                        <m:t>𝑏𝑖𝑎𝑠</m:t>
+                      </m:r>
+                    </m:oMath>
+                  </m:oMathPara>
+                </a14:m>
+                <a:endParaRPr lang="en-US" dirty="0"/>
+              </a:p>
+            </p:txBody>
+          </p:sp>
+        </mc:Choice>
+        <mc:Fallback>
+          <p:sp>
+            <p:nvSpPr>
+              <p:cNvPr id="7" name="TextBox 6">
+                <a:extLst>
+                  <a:ext uri="{FF2B5EF4-FFF2-40B4-BE49-F238E27FC236}">
+                    <a16:creationId xmlns:a16="http://schemas.microsoft.com/office/drawing/2014/main" id="{043FEF48-F291-2249-AA25-B58E23483191}"/>
+                  </a:ext>
+                </a:extLst>
+              </p:cNvPr>
+              <p:cNvSpPr txBox="1">
+                <a:spLocks noRot="1" noChangeAspect="1" noMove="1" noResize="1" noEditPoints="1" noAdjustHandles="1" noChangeArrowheads="1" noChangeShapeType="1" noTextEdit="1"/>
+              </p:cNvSpPr>
+              <p:nvPr/>
+            </p:nvSpPr>
+            <p:spPr>
+              <a:xfrm>
+                <a:off x="442639" y="4845738"/>
+                <a:ext cx="3968715" cy="369332"/>
+              </a:xfrm>
+              <a:prstGeom prst="rect">
+                <a:avLst/>
+              </a:prstGeom>
+              <a:blipFill>
+                <a:blip r:embed="rId5"/>
+                <a:stretch>
+                  <a:fillRect b="-16667"/>
+                </a:stretch>
+              </a:blipFill>
+            </p:spPr>
+            <p:txBody>
+              <a:bodyPr/>
+              <a:lstStyle/>
+              <a:p>
+                <a:r>
+                  <a:rPr lang="en-US">
+                    <a:noFill/>
+                  </a:rPr>
+                  <a:t> </a:t>
+                </a:r>
+              </a:p>
+            </p:txBody>
+          </p:sp>
+        </mc:Fallback>
+      </mc:AlternateContent>
+      <mc:AlternateContent xmlns:mc="http://schemas.openxmlformats.org/markup-compatibility/2006">
+        <mc:Choice xmlns:a14="http://schemas.microsoft.com/office/drawing/2010/main" Requires="a14">
+          <p:sp>
+            <p:nvSpPr>
+              <p:cNvPr id="9" name="Oval 8">
+                <a:extLst>
+                  <a:ext uri="{FF2B5EF4-FFF2-40B4-BE49-F238E27FC236}">
+                    <a16:creationId xmlns:a16="http://schemas.microsoft.com/office/drawing/2014/main" id="{6A5EAC86-CA47-1746-8950-D2C5AED93416}"/>
+                  </a:ext>
+                </a:extLst>
+              </p:cNvPr>
+              <p:cNvSpPr/>
+              <p:nvPr/>
+            </p:nvSpPr>
+            <p:spPr>
+              <a:xfrm>
+                <a:off x="2945754" y="1378946"/>
+                <a:ext cx="418353" cy="433294"/>
+              </a:xfrm>
+              <a:prstGeom prst="ellipse">
+                <a:avLst/>
+              </a:prstGeom>
+              <a:solidFill>
+                <a:schemeClr val="accent5">
+                  <a:lumMod val="60000"/>
+                  <a:lumOff val="40000"/>
+                </a:schemeClr>
+              </a:solidFill>
+              <a:ln>
+                <a:solidFill>
+                  <a:schemeClr val="tx1"/>
+                </a:solidFill>
+              </a:ln>
+            </p:spPr>
+            <p:style>
+              <a:lnRef idx="2">
+                <a:schemeClr val="accent1">
+                  <a:shade val="50000"/>
+                </a:schemeClr>
+              </a:lnRef>
+              <a:fillRef idx="1">
+                <a:schemeClr val="accent1"/>
+              </a:fillRef>
+              <a:effectRef idx="0">
+                <a:schemeClr val="accent1"/>
+              </a:effectRef>
+              <a:fontRef idx="minor">
+                <a:schemeClr val="lt1"/>
+              </a:fontRef>
+            </p:style>
+            <p:txBody>
+              <a:bodyPr rtlCol="0" anchor="ctr"/>
+              <a:lstStyle/>
+              <a:p>
+                <a:pPr algn="ctr"/>
+                <a14:m>
+                  <m:oMathPara xmlns:m="http://schemas.openxmlformats.org/officeDocument/2006/math">
+                    <m:oMathParaPr>
+                      <m:jc m:val="centerGroup"/>
+                    </m:oMathParaPr>
+                    <m:oMath xmlns:m="http://schemas.openxmlformats.org/officeDocument/2006/math">
+                      <m:acc>
+                        <m:accPr>
+                          <m:chr m:val="̃"/>
+                          <m:ctrlPr>
+                            <a:rPr lang="en-US" i="1" smtClean="0">
+                              <a:solidFill>
+                                <a:schemeClr val="tx1"/>
+                              </a:solidFill>
+                              <a:latin typeface="Cambria Math" panose="02040503050406030204" pitchFamily="18" charset="0"/>
+                            </a:rPr>
+                          </m:ctrlPr>
+                        </m:accPr>
+                        <m:e>
+                          <m:r>
+                            <a:rPr lang="en-US" b="0" i="1" smtClean="0">
+                              <a:solidFill>
+                                <a:schemeClr val="tx1"/>
+                              </a:solidFill>
+                              <a:latin typeface="Cambria Math" panose="02040503050406030204" pitchFamily="18" charset="0"/>
+                            </a:rPr>
+                            <m:t>𝑦</m:t>
+                          </m:r>
+                        </m:e>
+                      </m:acc>
+                    </m:oMath>
+                  </m:oMathPara>
+                </a14:m>
+                <a:endParaRPr lang="en-US" dirty="0">
+                  <a:solidFill>
+                    <a:schemeClr val="tx1"/>
+                  </a:solidFill>
+                </a:endParaRPr>
+              </a:p>
+            </p:txBody>
+          </p:sp>
+        </mc:Choice>
+        <mc:Fallback>
+          <p:sp>
+            <p:nvSpPr>
+              <p:cNvPr id="9" name="Oval 8">
+                <a:extLst>
+                  <a:ext uri="{FF2B5EF4-FFF2-40B4-BE49-F238E27FC236}">
+                    <a16:creationId xmlns:a16="http://schemas.microsoft.com/office/drawing/2014/main" id="{6A5EAC86-CA47-1746-8950-D2C5AED93416}"/>
+                  </a:ext>
+                </a:extLst>
+              </p:cNvPr>
+              <p:cNvSpPr>
+                <a:spLocks noRot="1" noChangeAspect="1" noMove="1" noResize="1" noEditPoints="1" noAdjustHandles="1" noChangeArrowheads="1" noChangeShapeType="1" noTextEdit="1"/>
+              </p:cNvSpPr>
+              <p:nvPr/>
+            </p:nvSpPr>
+            <p:spPr>
+              <a:xfrm>
+                <a:off x="2945754" y="1378946"/>
+                <a:ext cx="418353" cy="433294"/>
+              </a:xfrm>
+              <a:prstGeom prst="ellipse">
+                <a:avLst/>
+              </a:prstGeom>
+              <a:blipFill>
+                <a:blip r:embed="rId6"/>
+                <a:stretch>
+                  <a:fillRect/>
+                </a:stretch>
+              </a:blipFill>
+              <a:ln>
+                <a:solidFill>
+                  <a:schemeClr val="tx1"/>
+                </a:solidFill>
+              </a:ln>
+            </p:spPr>
+            <p:txBody>
+              <a:bodyPr/>
+              <a:lstStyle/>
+              <a:p>
+                <a:r>
+                  <a:rPr lang="en-US">
+                    <a:noFill/>
+                  </a:rPr>
+                  <a:t> </a:t>
+                </a:r>
+              </a:p>
+            </p:txBody>
+          </p:sp>
+        </mc:Fallback>
+      </mc:AlternateContent>
+      <p:sp>
+        <p:nvSpPr>
+          <p:cNvPr id="8" name="TextBox 7">
+            <a:extLst>
+              <a:ext uri="{FF2B5EF4-FFF2-40B4-BE49-F238E27FC236}">
+                <a16:creationId xmlns:a16="http://schemas.microsoft.com/office/drawing/2014/main" id="{1F8E8F54-3591-BD46-9656-FE2A124D558A}"/>
+              </a:ext>
+            </a:extLst>
+          </p:cNvPr>
+          <p:cNvSpPr txBox="1"/>
+          <p:nvPr/>
+        </p:nvSpPr>
+        <p:spPr>
+          <a:xfrm>
+            <a:off x="6528742" y="1895522"/>
+            <a:ext cx="764953" cy="369332"/>
+          </a:xfrm>
+          <a:prstGeom prst="rect">
+            <a:avLst/>
+          </a:prstGeom>
+          <a:noFill/>
+        </p:spPr>
+        <p:txBody>
+          <a:bodyPr wrap="none" rtlCol="0">
+            <a:spAutoFit/>
+          </a:bodyPr>
+          <a:lstStyle/>
+          <a:p>
+            <a:r>
+              <a:rPr lang="en-US" dirty="0"/>
+              <a:t>X= 1.0</a:t>
+            </a:r>
+          </a:p>
+        </p:txBody>
+      </p:sp>
+      <p:sp>
+        <p:nvSpPr>
+          <p:cNvPr id="10" name="TextBox 9">
+            <a:extLst>
+              <a:ext uri="{FF2B5EF4-FFF2-40B4-BE49-F238E27FC236}">
+                <a16:creationId xmlns:a16="http://schemas.microsoft.com/office/drawing/2014/main" id="{AED622B0-36F4-6C43-AD8D-3A31D96027C1}"/>
+              </a:ext>
+            </a:extLst>
+          </p:cNvPr>
+          <p:cNvSpPr txBox="1"/>
+          <p:nvPr/>
+        </p:nvSpPr>
+        <p:spPr>
+          <a:xfrm>
+            <a:off x="6528742" y="983716"/>
+            <a:ext cx="1267783" cy="369332"/>
+          </a:xfrm>
+          <a:prstGeom prst="rect">
+            <a:avLst/>
+          </a:prstGeom>
+          <a:noFill/>
+        </p:spPr>
+        <p:txBody>
+          <a:bodyPr wrap="none" rtlCol="0">
+            <a:spAutoFit/>
+          </a:bodyPr>
+          <a:lstStyle/>
+          <a:p>
+            <a:r>
+              <a:rPr lang="en-US" dirty="0"/>
+              <a:t>Max Y = 1.0</a:t>
+            </a:r>
+          </a:p>
+        </p:txBody>
+      </p:sp>
+      <p:cxnSp>
+        <p:nvCxnSpPr>
+          <p:cNvPr id="12" name="Straight Connector 11">
+            <a:extLst>
+              <a:ext uri="{FF2B5EF4-FFF2-40B4-BE49-F238E27FC236}">
+                <a16:creationId xmlns:a16="http://schemas.microsoft.com/office/drawing/2014/main" id="{086546ED-5079-8B40-9012-744D24AF398A}"/>
+              </a:ext>
+            </a:extLst>
+          </p:cNvPr>
+          <p:cNvCxnSpPr/>
+          <p:nvPr/>
+        </p:nvCxnSpPr>
+        <p:spPr>
+          <a:xfrm>
+            <a:off x="5936766" y="1852700"/>
+            <a:ext cx="591976" cy="0"/>
+          </a:xfrm>
+          <a:prstGeom prst="line">
+            <a:avLst/>
+          </a:prstGeom>
+        </p:spPr>
+        <p:style>
+          <a:lnRef idx="1">
+            <a:schemeClr val="accent1"/>
+          </a:lnRef>
+          <a:fillRef idx="0">
+            <a:schemeClr val="accent1"/>
+          </a:fillRef>
+          <a:effectRef idx="0">
+            <a:schemeClr val="accent1"/>
+          </a:effectRef>
+          <a:fontRef idx="minor">
+            <a:schemeClr val="tx1"/>
+          </a:fontRef>
+        </p:style>
+      </p:cxnSp>
+      <p:cxnSp>
+        <p:nvCxnSpPr>
+          <p:cNvPr id="14" name="Straight Connector 13">
+            <a:extLst>
+              <a:ext uri="{FF2B5EF4-FFF2-40B4-BE49-F238E27FC236}">
+                <a16:creationId xmlns:a16="http://schemas.microsoft.com/office/drawing/2014/main" id="{24B840EC-AE95-4546-8F6E-100E318B27A1}"/>
+              </a:ext>
+            </a:extLst>
+          </p:cNvPr>
+          <p:cNvCxnSpPr>
+            <a:cxnSpLocks/>
+          </p:cNvCxnSpPr>
+          <p:nvPr/>
+        </p:nvCxnSpPr>
+        <p:spPr>
+          <a:xfrm>
+            <a:off x="6528742" y="1310910"/>
+            <a:ext cx="0" cy="548808"/>
+          </a:xfrm>
+          <a:prstGeom prst="line">
+            <a:avLst/>
+          </a:prstGeom>
+        </p:spPr>
+        <p:style>
+          <a:lnRef idx="1">
+            <a:schemeClr val="accent1"/>
+          </a:lnRef>
+          <a:fillRef idx="0">
+            <a:schemeClr val="accent1"/>
+          </a:fillRef>
+          <a:effectRef idx="0">
+            <a:schemeClr val="accent1"/>
+          </a:effectRef>
+          <a:fontRef idx="minor">
+            <a:schemeClr val="tx1"/>
+          </a:fontRef>
+        </p:style>
+      </p:cxnSp>
+      <p:sp>
+        <p:nvSpPr>
+          <p:cNvPr id="17" name="TextBox 16">
+            <a:extLst>
+              <a:ext uri="{FF2B5EF4-FFF2-40B4-BE49-F238E27FC236}">
+                <a16:creationId xmlns:a16="http://schemas.microsoft.com/office/drawing/2014/main" id="{0B1C9515-7C9F-974B-A5AA-1E252470FA67}"/>
+              </a:ext>
+            </a:extLst>
+          </p:cNvPr>
+          <p:cNvSpPr txBox="1"/>
+          <p:nvPr/>
+        </p:nvSpPr>
+        <p:spPr>
+          <a:xfrm>
+            <a:off x="6528742" y="2210508"/>
+            <a:ext cx="1116011" cy="369332"/>
+          </a:xfrm>
+          <a:prstGeom prst="rect">
+            <a:avLst/>
+          </a:prstGeom>
+          <a:noFill/>
+        </p:spPr>
+        <p:txBody>
+          <a:bodyPr wrap="none" rtlCol="0">
+            <a:spAutoFit/>
+          </a:bodyPr>
+          <a:lstStyle/>
+          <a:p>
+            <a:r>
+              <a:rPr lang="en-US" dirty="0"/>
+              <a:t>X= 1000.0</a:t>
+            </a:r>
+          </a:p>
+        </p:txBody>
+      </p:sp>
+      <p:sp>
+        <p:nvSpPr>
+          <p:cNvPr id="16" name="TextBox 15">
+            <a:extLst>
+              <a:ext uri="{FF2B5EF4-FFF2-40B4-BE49-F238E27FC236}">
+                <a16:creationId xmlns:a16="http://schemas.microsoft.com/office/drawing/2014/main" id="{CB90DDD7-D20D-E242-B45B-3674131161FE}"/>
+              </a:ext>
+            </a:extLst>
+          </p:cNvPr>
+          <p:cNvSpPr txBox="1"/>
+          <p:nvPr/>
+        </p:nvSpPr>
+        <p:spPr>
+          <a:xfrm>
+            <a:off x="9043609" y="4956645"/>
+            <a:ext cx="2387320" cy="369332"/>
+          </a:xfrm>
+          <a:prstGeom prst="rect">
+            <a:avLst/>
+          </a:prstGeom>
+          <a:noFill/>
+        </p:spPr>
+        <p:txBody>
+          <a:bodyPr wrap="none" rtlCol="0">
+            <a:spAutoFit/>
+          </a:bodyPr>
+          <a:lstStyle/>
+          <a:p>
+            <a:r>
+              <a:rPr lang="en-US" b="1" dirty="0"/>
+              <a:t>Classification Problems</a:t>
             </a:r>
           </a:p>
         </p:txBody>
@@ -15206,4 +17372,299 @@
     </a:ext>
   </a:extLst>
 </a:theme>
+</file>
+
+<file path=ppt/theme/theme2.xml><?xml version="1.0" encoding="utf-8"?>
+<a:theme xmlns:a="http://schemas.openxmlformats.org/drawingml/2006/main" name="Office Theme">
+  <a:themeElements>
+    <a:clrScheme name="Office">
+      <a:dk1>
+        <a:sysClr val="windowText" lastClr="000000"/>
+      </a:dk1>
+      <a:lt1>
+        <a:sysClr val="window" lastClr="FFFFFF"/>
+      </a:lt1>
+      <a:dk2>
+        <a:srgbClr val="44546A"/>
+      </a:dk2>
+      <a:lt2>
+        <a:srgbClr val="E7E6E6"/>
+      </a:lt2>
+      <a:accent1>
+        <a:srgbClr val="4472C4"/>
+      </a:accent1>
+      <a:accent2>
+        <a:srgbClr val="ED7D31"/>
+      </a:accent2>
+      <a:accent3>
+        <a:srgbClr val="A5A5A5"/>
+      </a:accent3>
+      <a:accent4>
+        <a:srgbClr val="FFC000"/>
+      </a:accent4>
+      <a:accent5>
+        <a:srgbClr val="5B9BD5"/>
+      </a:accent5>
+      <a:accent6>
+        <a:srgbClr val="70AD47"/>
+      </a:accent6>
+      <a:hlink>
+        <a:srgbClr val="0563C1"/>
+      </a:hlink>
+      <a:folHlink>
+        <a:srgbClr val="954F72"/>
+      </a:folHlink>
+    </a:clrScheme>
+    <a:fontScheme name="Office">
+      <a:majorFont>
+        <a:latin typeface="Calibri Light" panose="020F0302020204030204"/>
+        <a:ea typeface=""/>
+        <a:cs typeface=""/>
+        <a:font script="Jpan" typeface="游ゴシック Light"/>
+        <a:font script="Hang" typeface="맑은 고딕"/>
+        <a:font script="Hans" typeface="等线 Light"/>
+        <a:font script="Hant" typeface="新細明體"/>
+        <a:font script="Arab" typeface="Times New Roman"/>
+        <a:font script="Hebr" typeface="Times New Roman"/>
+        <a:font script="Thai" typeface="Angsana New"/>
+        <a:font script="Ethi" typeface="Nyala"/>
+        <a:font script="Beng" typeface="Vrinda"/>
+        <a:font script="Gujr" typeface="Shruti"/>
+        <a:font script="Khmr" typeface="MoolBoran"/>
+        <a:font script="Knda" typeface="Tunga"/>
+        <a:font script="Guru" typeface="Raavi"/>
+        <a:font script="Cans" typeface="Euphemia"/>
+        <a:font script="Cher" typeface="Plantagenet Cherokee"/>
+        <a:font script="Yiii" typeface="Microsoft Yi Baiti"/>
+        <a:font script="Tibt" typeface="Microsoft Himalaya"/>
+        <a:font script="Thaa" typeface="MV Boli"/>
+        <a:font script="Deva" typeface="Mangal"/>
+        <a:font script="Telu" typeface="Gautami"/>
+        <a:font script="Taml" typeface="Latha"/>
+        <a:font script="Syrc" typeface="Estrangelo Edessa"/>
+        <a:font script="Orya" typeface="Kalinga"/>
+        <a:font script="Mlym" typeface="Kartika"/>
+        <a:font script="Laoo" typeface="DokChampa"/>
+        <a:font script="Sinh" typeface="Iskoola Pota"/>
+        <a:font script="Mong" typeface="Mongolian Baiti"/>
+        <a:font script="Viet" typeface="Times New Roman"/>
+        <a:font script="Uigh" typeface="Microsoft Uighur"/>
+        <a:font script="Geor" typeface="Sylfaen"/>
+        <a:font script="Armn" typeface="Arial"/>
+        <a:font script="Bugi" typeface="Leelawadee UI"/>
+        <a:font script="Bopo" typeface="Microsoft JhengHei"/>
+        <a:font script="Java" typeface="Javanese Text"/>
+        <a:font script="Lisu" typeface="Segoe UI"/>
+        <a:font script="Mymr" typeface="Myanmar Text"/>
+        <a:font script="Nkoo" typeface="Ebrima"/>
+        <a:font script="Olck" typeface="Nirmala UI"/>
+        <a:font script="Osma" typeface="Ebrima"/>
+        <a:font script="Phag" typeface="Phagspa"/>
+        <a:font script="Syrn" typeface="Estrangelo Edessa"/>
+        <a:font script="Syrj" typeface="Estrangelo Edessa"/>
+        <a:font script="Syre" typeface="Estrangelo Edessa"/>
+        <a:font script="Sora" typeface="Nirmala UI"/>
+        <a:font script="Tale" typeface="Microsoft Tai Le"/>
+        <a:font script="Talu" typeface="Microsoft New Tai Lue"/>
+        <a:font script="Tfng" typeface="Ebrima"/>
+      </a:majorFont>
+      <a:minorFont>
+        <a:latin typeface="Calibri" panose="020F0502020204030204"/>
+        <a:ea typeface=""/>
+        <a:cs typeface=""/>
+        <a:font script="Jpan" typeface="游ゴシック"/>
+        <a:font script="Hang" typeface="맑은 고딕"/>
+        <a:font script="Hans" typeface="等线"/>
+        <a:font script="Hant" typeface="新細明體"/>
+        <a:font script="Arab" typeface="Arial"/>
+        <a:font script="Hebr" typeface="Arial"/>
+        <a:font script="Thai" typeface="Cordia New"/>
+        <a:font script="Ethi" typeface="Nyala"/>
+        <a:font script="Beng" typeface="Vrinda"/>
+        <a:font script="Gujr" typeface="Shruti"/>
+        <a:font script="Khmr" typeface="DaunPenh"/>
+        <a:font script="Knda" typeface="Tunga"/>
+        <a:font script="Guru" typeface="Raavi"/>
+        <a:font script="Cans" typeface="Euphemia"/>
+        <a:font script="Cher" typeface="Plantagenet Cherokee"/>
+        <a:font script="Yiii" typeface="Microsoft Yi Baiti"/>
+        <a:font script="Tibt" typeface="Microsoft Himalaya"/>
+        <a:font script="Thaa" typeface="MV Boli"/>
+        <a:font script="Deva" typeface="Mangal"/>
+        <a:font script="Telu" typeface="Gautami"/>
+        <a:font script="Taml" typeface="Latha"/>
+        <a:font script="Syrc" typeface="Estrangelo Edessa"/>
+        <a:font script="Orya" typeface="Kalinga"/>
+        <a:font script="Mlym" typeface="Kartika"/>
+        <a:font script="Laoo" typeface="DokChampa"/>
+        <a:font script="Sinh" typeface="Iskoola Pota"/>
+        <a:font script="Mong" typeface="Mongolian Baiti"/>
+        <a:font script="Viet" typeface="Arial"/>
+        <a:font script="Uigh" typeface="Microsoft Uighur"/>
+        <a:font script="Geor" typeface="Sylfaen"/>
+        <a:font script="Armn" typeface="Arial"/>
+        <a:font script="Bugi" typeface="Leelawadee UI"/>
+        <a:font script="Bopo" typeface="Microsoft JhengHei"/>
+        <a:font script="Java" typeface="Javanese Text"/>
+        <a:font script="Lisu" typeface="Segoe UI"/>
+        <a:font script="Mymr" typeface="Myanmar Text"/>
+        <a:font script="Nkoo" typeface="Ebrima"/>
+        <a:font script="Olck" typeface="Nirmala UI"/>
+        <a:font script="Osma" typeface="Ebrima"/>
+        <a:font script="Phag" typeface="Phagspa"/>
+        <a:font script="Syrn" typeface="Estrangelo Edessa"/>
+        <a:font script="Syrj" typeface="Estrangelo Edessa"/>
+        <a:font script="Syre" typeface="Estrangelo Edessa"/>
+        <a:font script="Sora" typeface="Nirmala UI"/>
+        <a:font script="Tale" typeface="Microsoft Tai Le"/>
+        <a:font script="Talu" typeface="Microsoft New Tai Lue"/>
+        <a:font script="Tfng" typeface="Ebrima"/>
+      </a:minorFont>
+    </a:fontScheme>
+    <a:fmtScheme name="Office">
+      <a:fillStyleLst>
+        <a:solidFill>
+          <a:schemeClr val="phClr"/>
+        </a:solidFill>
+        <a:gradFill rotWithShape="1">
+          <a:gsLst>
+            <a:gs pos="0">
+              <a:schemeClr val="phClr">
+                <a:lumMod val="110000"/>
+                <a:satMod val="105000"/>
+                <a:tint val="67000"/>
+              </a:schemeClr>
+            </a:gs>
+            <a:gs pos="50000">
+              <a:schemeClr val="phClr">
+                <a:lumMod val="105000"/>
+                <a:satMod val="103000"/>
+                <a:tint val="73000"/>
+              </a:schemeClr>
+            </a:gs>
+            <a:gs pos="100000">
+              <a:schemeClr val="phClr">
+                <a:lumMod val="105000"/>
+                <a:satMod val="109000"/>
+                <a:tint val="81000"/>
+              </a:schemeClr>
+            </a:gs>
+          </a:gsLst>
+          <a:lin ang="5400000" scaled="0"/>
+        </a:gradFill>
+        <a:gradFill rotWithShape="1">
+          <a:gsLst>
+            <a:gs pos="0">
+              <a:schemeClr val="phClr">
+                <a:satMod val="103000"/>
+                <a:lumMod val="102000"/>
+                <a:tint val="94000"/>
+              </a:schemeClr>
+            </a:gs>
+            <a:gs pos="50000">
+              <a:schemeClr val="phClr">
+                <a:satMod val="110000"/>
+                <a:lumMod val="100000"/>
+                <a:shade val="100000"/>
+              </a:schemeClr>
+            </a:gs>
+            <a:gs pos="100000">
+              <a:schemeClr val="phClr">
+                <a:lumMod val="99000"/>
+                <a:satMod val="120000"/>
+                <a:shade val="78000"/>
+              </a:schemeClr>
+            </a:gs>
+          </a:gsLst>
+          <a:lin ang="5400000" scaled="0"/>
+        </a:gradFill>
+      </a:fillStyleLst>
+      <a:lnStyleLst>
+        <a:ln w="6350" cap="flat" cmpd="sng" algn="ctr">
+          <a:solidFill>
+            <a:schemeClr val="phClr"/>
+          </a:solidFill>
+          <a:prstDash val="solid"/>
+          <a:miter lim="800000"/>
+        </a:ln>
+        <a:ln w="12700" cap="flat" cmpd="sng" algn="ctr">
+          <a:solidFill>
+            <a:schemeClr val="phClr"/>
+          </a:solidFill>
+          <a:prstDash val="solid"/>
+          <a:miter lim="800000"/>
+        </a:ln>
+        <a:ln w="19050" cap="flat" cmpd="sng" algn="ctr">
+          <a:solidFill>
+            <a:schemeClr val="phClr"/>
+          </a:solidFill>
+          <a:prstDash val="solid"/>
+          <a:miter lim="800000"/>
+        </a:ln>
+      </a:lnStyleLst>
+      <a:effectStyleLst>
+        <a:effectStyle>
+          <a:effectLst/>
+        </a:effectStyle>
+        <a:effectStyle>
+          <a:effectLst/>
+        </a:effectStyle>
+        <a:effectStyle>
+          <a:effectLst>
+            <a:outerShdw blurRad="57150" dist="19050" dir="5400000" algn="ctr" rotWithShape="0">
+              <a:srgbClr val="000000">
+                <a:alpha val="63000"/>
+              </a:srgbClr>
+            </a:outerShdw>
+          </a:effectLst>
+        </a:effectStyle>
+      </a:effectStyleLst>
+      <a:bgFillStyleLst>
+        <a:solidFill>
+          <a:schemeClr val="phClr"/>
+        </a:solidFill>
+        <a:solidFill>
+          <a:schemeClr val="phClr">
+            <a:tint val="95000"/>
+            <a:satMod val="170000"/>
+          </a:schemeClr>
+        </a:solidFill>
+        <a:gradFill rotWithShape="1">
+          <a:gsLst>
+            <a:gs pos="0">
+              <a:schemeClr val="phClr">
+                <a:tint val="93000"/>
+                <a:satMod val="150000"/>
+                <a:shade val="98000"/>
+                <a:lumMod val="102000"/>
+              </a:schemeClr>
+            </a:gs>
+            <a:gs pos="50000">
+              <a:schemeClr val="phClr">
+                <a:tint val="98000"/>
+                <a:satMod val="130000"/>
+                <a:shade val="90000"/>
+                <a:lumMod val="103000"/>
+              </a:schemeClr>
+            </a:gs>
+            <a:gs pos="100000">
+              <a:schemeClr val="phClr">
+                <a:shade val="63000"/>
+                <a:satMod val="120000"/>
+              </a:schemeClr>
+            </a:gs>
+          </a:gsLst>
+          <a:lin ang="5400000" scaled="0"/>
+        </a:gradFill>
+      </a:bgFillStyleLst>
+    </a:fmtScheme>
+  </a:themeElements>
+  <a:objectDefaults/>
+  <a:extraClrSchemeLst/>
+  <a:extLst>
+    <a:ext uri="{05A4C25C-085E-4340-85A3-A5531E510DB2}">
+      <thm15:themeFamily xmlns:thm15="http://schemas.microsoft.com/office/thememl/2012/main" name="Office Theme" id="{62F939B6-93AF-4DB8-9C6B-D6C7DFDC589F}" vid="{4A3C46E8-61CC-4603-A589-7422A47A8E4A}"/>
+    </a:ext>
+  </a:extLst>
+</a:theme>
 </file>
</xml_diff>